<commit_message>
retrait prints et commentaires inutiles + ajout powerpoint
</commit_message>
<xml_diff>
--- a/documentation/travail_bachelor/ISC_LOG_presentation_diplome_RodriguesDosSantosFabio_EggenbergNiklaus_2024.pptx
+++ b/documentation/travail_bachelor/ISC_LOG_presentation_diplome_RodriguesDosSantosFabio_EggenbergNiklaus_2024.pptx
@@ -4,6 +4,9 @@
   <p:sldMasterIdLst>
     <p:sldMasterId id="2147483840" r:id="rId1"/>
   </p:sldMasterIdLst>
+  <p:notesMasterIdLst>
+    <p:notesMasterId r:id="rId4"/>
+  </p:notesMasterIdLst>
   <p:sldIdLst>
     <p:sldId id="256" r:id="rId2"/>
     <p:sldId id="257" r:id="rId3"/>
@@ -108,6 +111,356 @@
 </p:presentation>
 </file>
 
+<file path=ppt/notesMasters/notesMaster1.xml><?xml version="1.0" encoding="utf-8"?>
+<p:notesMaster xmlns:a="http://schemas.openxmlformats.org/drawingml/2006/main" xmlns:r="http://schemas.openxmlformats.org/officeDocument/2006/relationships" xmlns:p="http://schemas.openxmlformats.org/presentationml/2006/main">
+  <p:cSld>
+    <p:bg>
+      <p:bgRef idx="1001">
+        <a:schemeClr val="bg1"/>
+      </p:bgRef>
+    </p:bg>
+    <p:spTree>
+      <p:nvGrpSpPr>
+        <p:cNvPr id="1" name=""/>
+        <p:cNvGrpSpPr/>
+        <p:nvPr/>
+      </p:nvGrpSpPr>
+      <p:grpSpPr>
+        <a:xfrm>
+          <a:off x="0" y="0"/>
+          <a:ext cx="0" cy="0"/>
+          <a:chOff x="0" y="0"/>
+          <a:chExt cx="0" cy="0"/>
+        </a:xfrm>
+      </p:grpSpPr>
+      <p:sp>
+        <p:nvSpPr>
+          <p:cNvPr id="2" name="Espace réservé de l'en-tête 1"/>
+          <p:cNvSpPr>
+            <a:spLocks noGrp="1"/>
+          </p:cNvSpPr>
+          <p:nvPr>
+            <p:ph type="hdr" sz="quarter"/>
+          </p:nvPr>
+        </p:nvSpPr>
+        <p:spPr>
+          <a:xfrm>
+            <a:off x="0" y="0"/>
+            <a:ext cx="2971800" cy="458788"/>
+          </a:xfrm>
+          <a:prstGeom prst="rect">
+            <a:avLst/>
+          </a:prstGeom>
+        </p:spPr>
+        <p:txBody>
+          <a:bodyPr vert="horz" lIns="91440" tIns="45720" rIns="91440" bIns="45720" rtlCol="0"/>
+          <a:lstStyle>
+            <a:lvl1pPr algn="l">
+              <a:defRPr sz="1200"/>
+            </a:lvl1pPr>
+          </a:lstStyle>
+          <a:p>
+            <a:endParaRPr lang="fr-CH"/>
+          </a:p>
+        </p:txBody>
+      </p:sp>
+      <p:sp>
+        <p:nvSpPr>
+          <p:cNvPr id="3" name="Espace réservé de la date 2"/>
+          <p:cNvSpPr>
+            <a:spLocks noGrp="1"/>
+          </p:cNvSpPr>
+          <p:nvPr>
+            <p:ph type="dt" idx="1"/>
+          </p:nvPr>
+        </p:nvSpPr>
+        <p:spPr>
+          <a:xfrm>
+            <a:off x="3884613" y="0"/>
+            <a:ext cx="2971800" cy="458788"/>
+          </a:xfrm>
+          <a:prstGeom prst="rect">
+            <a:avLst/>
+          </a:prstGeom>
+        </p:spPr>
+        <p:txBody>
+          <a:bodyPr vert="horz" lIns="91440" tIns="45720" rIns="91440" bIns="45720" rtlCol="0"/>
+          <a:lstStyle>
+            <a:lvl1pPr algn="r">
+              <a:defRPr sz="1200"/>
+            </a:lvl1pPr>
+          </a:lstStyle>
+          <a:p>
+            <a:fld id="{42AC3142-495C-4280-881B-1526FF75665B}" type="datetimeFigureOut">
+              <a:rPr lang="fr-CH" smtClean="0"/>
+              <a:t>17.08.2024</a:t>
+            </a:fld>
+            <a:endParaRPr lang="fr-CH"/>
+          </a:p>
+        </p:txBody>
+      </p:sp>
+      <p:sp>
+        <p:nvSpPr>
+          <p:cNvPr id="4" name="Espace réservé de l'image des diapositives 3"/>
+          <p:cNvSpPr>
+            <a:spLocks noGrp="1" noRot="1" noChangeAspect="1"/>
+          </p:cNvSpPr>
+          <p:nvPr>
+            <p:ph type="sldImg" idx="2"/>
+          </p:nvPr>
+        </p:nvSpPr>
+        <p:spPr>
+          <a:xfrm>
+            <a:off x="685800" y="1143000"/>
+            <a:ext cx="5486400" cy="3086100"/>
+          </a:xfrm>
+          <a:prstGeom prst="rect">
+            <a:avLst/>
+          </a:prstGeom>
+          <a:noFill/>
+          <a:ln w="12700">
+            <a:solidFill>
+              <a:prstClr val="black"/>
+            </a:solidFill>
+          </a:ln>
+        </p:spPr>
+        <p:txBody>
+          <a:bodyPr vert="horz" lIns="91440" tIns="45720" rIns="91440" bIns="45720" rtlCol="0" anchor="ctr"/>
+          <a:lstStyle/>
+          <a:p>
+            <a:endParaRPr lang="fr-CH"/>
+          </a:p>
+        </p:txBody>
+      </p:sp>
+      <p:sp>
+        <p:nvSpPr>
+          <p:cNvPr id="5" name="Espace réservé des notes 4"/>
+          <p:cNvSpPr>
+            <a:spLocks noGrp="1"/>
+          </p:cNvSpPr>
+          <p:nvPr>
+            <p:ph type="body" sz="quarter" idx="3"/>
+          </p:nvPr>
+        </p:nvSpPr>
+        <p:spPr>
+          <a:xfrm>
+            <a:off x="685800" y="4400550"/>
+            <a:ext cx="5486400" cy="3600450"/>
+          </a:xfrm>
+          <a:prstGeom prst="rect">
+            <a:avLst/>
+          </a:prstGeom>
+        </p:spPr>
+        <p:txBody>
+          <a:bodyPr vert="horz" lIns="91440" tIns="45720" rIns="91440" bIns="45720" rtlCol="0"/>
+          <a:lstStyle/>
+          <a:p>
+            <a:pPr lvl="0"/>
+            <a:r>
+              <a:rPr lang="fr-FR"/>
+              <a:t>Cliquez pour modifier les styles du texte du masque</a:t>
+            </a:r>
+          </a:p>
+          <a:p>
+            <a:pPr lvl="1"/>
+            <a:r>
+              <a:rPr lang="fr-FR"/>
+              <a:t>Deuxième niveau</a:t>
+            </a:r>
+          </a:p>
+          <a:p>
+            <a:pPr lvl="2"/>
+            <a:r>
+              <a:rPr lang="fr-FR"/>
+              <a:t>Troisième niveau</a:t>
+            </a:r>
+          </a:p>
+          <a:p>
+            <a:pPr lvl="3"/>
+            <a:r>
+              <a:rPr lang="fr-FR"/>
+              <a:t>Quatrième niveau</a:t>
+            </a:r>
+          </a:p>
+          <a:p>
+            <a:pPr lvl="4"/>
+            <a:r>
+              <a:rPr lang="fr-FR"/>
+              <a:t>Cinquième niveau</a:t>
+            </a:r>
+            <a:endParaRPr lang="fr-CH"/>
+          </a:p>
+        </p:txBody>
+      </p:sp>
+      <p:sp>
+        <p:nvSpPr>
+          <p:cNvPr id="6" name="Espace réservé du pied de page 5"/>
+          <p:cNvSpPr>
+            <a:spLocks noGrp="1"/>
+          </p:cNvSpPr>
+          <p:nvPr>
+            <p:ph type="ftr" sz="quarter" idx="4"/>
+          </p:nvPr>
+        </p:nvSpPr>
+        <p:spPr>
+          <a:xfrm>
+            <a:off x="0" y="8685213"/>
+            <a:ext cx="2971800" cy="458787"/>
+          </a:xfrm>
+          <a:prstGeom prst="rect">
+            <a:avLst/>
+          </a:prstGeom>
+        </p:spPr>
+        <p:txBody>
+          <a:bodyPr vert="horz" lIns="91440" tIns="45720" rIns="91440" bIns="45720" rtlCol="0" anchor="b"/>
+          <a:lstStyle>
+            <a:lvl1pPr algn="l">
+              <a:defRPr sz="1200"/>
+            </a:lvl1pPr>
+          </a:lstStyle>
+          <a:p>
+            <a:endParaRPr lang="fr-CH"/>
+          </a:p>
+        </p:txBody>
+      </p:sp>
+      <p:sp>
+        <p:nvSpPr>
+          <p:cNvPr id="7" name="Espace réservé du numéro de diapositive 6"/>
+          <p:cNvSpPr>
+            <a:spLocks noGrp="1"/>
+          </p:cNvSpPr>
+          <p:nvPr>
+            <p:ph type="sldNum" sz="quarter" idx="5"/>
+          </p:nvPr>
+        </p:nvSpPr>
+        <p:spPr>
+          <a:xfrm>
+            <a:off x="3884613" y="8685213"/>
+            <a:ext cx="2971800" cy="458787"/>
+          </a:xfrm>
+          <a:prstGeom prst="rect">
+            <a:avLst/>
+          </a:prstGeom>
+        </p:spPr>
+        <p:txBody>
+          <a:bodyPr vert="horz" lIns="91440" tIns="45720" rIns="91440" bIns="45720" rtlCol="0" anchor="b"/>
+          <a:lstStyle>
+            <a:lvl1pPr algn="r">
+              <a:defRPr sz="1200"/>
+            </a:lvl1pPr>
+          </a:lstStyle>
+          <a:p>
+            <a:fld id="{C0A1A13C-C183-424C-A414-74278106B563}" type="slidenum">
+              <a:rPr lang="fr-CH" smtClean="0"/>
+              <a:t>‹N°›</a:t>
+            </a:fld>
+            <a:endParaRPr lang="fr-CH"/>
+          </a:p>
+        </p:txBody>
+      </p:sp>
+    </p:spTree>
+    <p:extLst>
+      <p:ext uri="{BB962C8B-B14F-4D97-AF65-F5344CB8AC3E}">
+        <p14:creationId xmlns:p14="http://schemas.microsoft.com/office/powerpoint/2010/main" val="4184559138"/>
+      </p:ext>
+    </p:extLst>
+  </p:cSld>
+  <p:clrMap bg1="lt1" tx1="dk1" bg2="lt2" tx2="dk2" accent1="accent1" accent2="accent2" accent3="accent3" accent4="accent4" accent5="accent5" accent6="accent6" hlink="hlink" folHlink="folHlink"/>
+  <p:notesStyle>
+    <a:lvl1pPr marL="0" algn="l" defTabSz="914400" rtl="0" eaLnBrk="1" latinLnBrk="0" hangingPunct="1">
+      <a:defRPr sz="1200" kern="1200">
+        <a:solidFill>
+          <a:schemeClr val="tx1"/>
+        </a:solidFill>
+        <a:latin typeface="+mn-lt"/>
+        <a:ea typeface="+mn-ea"/>
+        <a:cs typeface="+mn-cs"/>
+      </a:defRPr>
+    </a:lvl1pPr>
+    <a:lvl2pPr marL="457200" algn="l" defTabSz="914400" rtl="0" eaLnBrk="1" latinLnBrk="0" hangingPunct="1">
+      <a:defRPr sz="1200" kern="1200">
+        <a:solidFill>
+          <a:schemeClr val="tx1"/>
+        </a:solidFill>
+        <a:latin typeface="+mn-lt"/>
+        <a:ea typeface="+mn-ea"/>
+        <a:cs typeface="+mn-cs"/>
+      </a:defRPr>
+    </a:lvl2pPr>
+    <a:lvl3pPr marL="914400" algn="l" defTabSz="914400" rtl="0" eaLnBrk="1" latinLnBrk="0" hangingPunct="1">
+      <a:defRPr sz="1200" kern="1200">
+        <a:solidFill>
+          <a:schemeClr val="tx1"/>
+        </a:solidFill>
+        <a:latin typeface="+mn-lt"/>
+        <a:ea typeface="+mn-ea"/>
+        <a:cs typeface="+mn-cs"/>
+      </a:defRPr>
+    </a:lvl3pPr>
+    <a:lvl4pPr marL="1371600" algn="l" defTabSz="914400" rtl="0" eaLnBrk="1" latinLnBrk="0" hangingPunct="1">
+      <a:defRPr sz="1200" kern="1200">
+        <a:solidFill>
+          <a:schemeClr val="tx1"/>
+        </a:solidFill>
+        <a:latin typeface="+mn-lt"/>
+        <a:ea typeface="+mn-ea"/>
+        <a:cs typeface="+mn-cs"/>
+      </a:defRPr>
+    </a:lvl4pPr>
+    <a:lvl5pPr marL="1828800" algn="l" defTabSz="914400" rtl="0" eaLnBrk="1" latinLnBrk="0" hangingPunct="1">
+      <a:defRPr sz="1200" kern="1200">
+        <a:solidFill>
+          <a:schemeClr val="tx1"/>
+        </a:solidFill>
+        <a:latin typeface="+mn-lt"/>
+        <a:ea typeface="+mn-ea"/>
+        <a:cs typeface="+mn-cs"/>
+      </a:defRPr>
+    </a:lvl5pPr>
+    <a:lvl6pPr marL="2286000" algn="l" defTabSz="914400" rtl="0" eaLnBrk="1" latinLnBrk="0" hangingPunct="1">
+      <a:defRPr sz="1200" kern="1200">
+        <a:solidFill>
+          <a:schemeClr val="tx1"/>
+        </a:solidFill>
+        <a:latin typeface="+mn-lt"/>
+        <a:ea typeface="+mn-ea"/>
+        <a:cs typeface="+mn-cs"/>
+      </a:defRPr>
+    </a:lvl6pPr>
+    <a:lvl7pPr marL="2743200" algn="l" defTabSz="914400" rtl="0" eaLnBrk="1" latinLnBrk="0" hangingPunct="1">
+      <a:defRPr sz="1200" kern="1200">
+        <a:solidFill>
+          <a:schemeClr val="tx1"/>
+        </a:solidFill>
+        <a:latin typeface="+mn-lt"/>
+        <a:ea typeface="+mn-ea"/>
+        <a:cs typeface="+mn-cs"/>
+      </a:defRPr>
+    </a:lvl7pPr>
+    <a:lvl8pPr marL="3200400" algn="l" defTabSz="914400" rtl="0" eaLnBrk="1" latinLnBrk="0" hangingPunct="1">
+      <a:defRPr sz="1200" kern="1200">
+        <a:solidFill>
+          <a:schemeClr val="tx1"/>
+        </a:solidFill>
+        <a:latin typeface="+mn-lt"/>
+        <a:ea typeface="+mn-ea"/>
+        <a:cs typeface="+mn-cs"/>
+      </a:defRPr>
+    </a:lvl8pPr>
+    <a:lvl9pPr marL="3657600" algn="l" defTabSz="914400" rtl="0" eaLnBrk="1" latinLnBrk="0" hangingPunct="1">
+      <a:defRPr sz="1200" kern="1200">
+        <a:solidFill>
+          <a:schemeClr val="tx1"/>
+        </a:solidFill>
+        <a:latin typeface="+mn-lt"/>
+        <a:ea typeface="+mn-ea"/>
+        <a:cs typeface="+mn-cs"/>
+      </a:defRPr>
+    </a:lvl9pPr>
+  </p:notesStyle>
+</p:notesMaster>
+</file>
+
 <file path=ppt/slideLayouts/slideLayout1.xml><?xml version="1.0" encoding="utf-8"?>
 <p:sldLayout xmlns:a="http://schemas.openxmlformats.org/drawingml/2006/main" xmlns:r="http://schemas.openxmlformats.org/officeDocument/2006/relationships" xmlns:p="http://schemas.openxmlformats.org/presentationml/2006/main" showMasterSp="0" type="title" preserve="1">
   <p:cSld name="Diapositive de titre">
@@ -330,9 +683,8 @@
           <a:bodyPr/>
           <a:lstStyle/>
           <a:p>
-            <a:fld id="{5586B75A-687E-405C-8A0B-8D00578BA2C3}" type="datetimeFigureOut">
-              <a:rPr lang="en-US" dirty="0"/>
-              <a:pPr/>
+            <a:fld id="{697BC7A4-560B-4424-86D9-D529C3ED2E24}" type="datetime1">
+              <a:rPr lang="en-US" smtClean="0"/>
               <a:t>8/17/2024</a:t>
             </a:fld>
             <a:endParaRPr lang="en-US" dirty="0"/>
@@ -354,6 +706,10 @@
           <a:bodyPr/>
           <a:lstStyle/>
           <a:p>
+            <a:r>
+              <a:rPr lang="fr-CH"/>
+              <a:t>Présentation BA - Chatbot Réservation - Rodrigues dos Santos Fabio</a:t>
+            </a:r>
             <a:endParaRPr lang="en-US" dirty="0"/>
           </a:p>
         </p:txBody>
@@ -497,9 +853,8 @@
           <a:bodyPr/>
           <a:lstStyle/>
           <a:p>
-            <a:fld id="{5586B75A-687E-405C-8A0B-8D00578BA2C3}" type="datetimeFigureOut">
-              <a:rPr lang="en-US" dirty="0"/>
-              <a:pPr/>
+            <a:fld id="{6E901063-52CC-4584-9EE9-3A5FBF2927BA}" type="datetime1">
+              <a:rPr lang="en-US" smtClean="0"/>
               <a:t>8/17/2024</a:t>
             </a:fld>
             <a:endParaRPr lang="en-US" dirty="0"/>
@@ -521,6 +876,10 @@
           <a:bodyPr/>
           <a:lstStyle/>
           <a:p>
+            <a:r>
+              <a:rPr lang="fr-CH"/>
+              <a:t>Présentation BA - Chatbot Réservation - Rodrigues dos Santos Fabio</a:t>
+            </a:r>
             <a:endParaRPr lang="en-US" dirty="0"/>
           </a:p>
         </p:txBody>
@@ -674,9 +1033,8 @@
           <a:bodyPr/>
           <a:lstStyle/>
           <a:p>
-            <a:fld id="{5586B75A-687E-405C-8A0B-8D00578BA2C3}" type="datetimeFigureOut">
-              <a:rPr lang="en-US" dirty="0"/>
-              <a:pPr/>
+            <a:fld id="{45B21167-5961-4EAA-A2C5-C443E1B8357A}" type="datetime1">
+              <a:rPr lang="en-US" smtClean="0"/>
               <a:t>8/17/2024</a:t>
             </a:fld>
             <a:endParaRPr lang="en-US" dirty="0"/>
@@ -698,6 +1056,10 @@
           <a:bodyPr/>
           <a:lstStyle/>
           <a:p>
+            <a:r>
+              <a:rPr lang="fr-CH"/>
+              <a:t>Présentation BA - Chatbot Réservation - Rodrigues dos Santos Fabio</a:t>
+            </a:r>
             <a:endParaRPr lang="en-US" dirty="0"/>
           </a:p>
         </p:txBody>
@@ -841,9 +1203,8 @@
           <a:bodyPr/>
           <a:lstStyle/>
           <a:p>
-            <a:fld id="{5586B75A-687E-405C-8A0B-8D00578BA2C3}" type="datetimeFigureOut">
-              <a:rPr lang="en-US" dirty="0"/>
-              <a:pPr/>
+            <a:fld id="{77856CEA-0161-4B0B-A6F9-D90790302E09}" type="datetime1">
+              <a:rPr lang="en-US" smtClean="0"/>
               <a:t>8/17/2024</a:t>
             </a:fld>
             <a:endParaRPr lang="en-US" dirty="0"/>
@@ -865,6 +1226,10 @@
           <a:bodyPr/>
           <a:lstStyle/>
           <a:p>
+            <a:r>
+              <a:rPr lang="fr-CH"/>
+              <a:t>Présentation BA - Chatbot Réservation - Rodrigues dos Santos Fabio</a:t>
+            </a:r>
             <a:endParaRPr lang="en-US" dirty="0"/>
           </a:p>
         </p:txBody>
@@ -1096,9 +1461,8 @@
           <a:bodyPr/>
           <a:lstStyle/>
           <a:p>
-            <a:fld id="{5586B75A-687E-405C-8A0B-8D00578BA2C3}" type="datetimeFigureOut">
-              <a:rPr lang="en-US" dirty="0"/>
-              <a:pPr/>
+            <a:fld id="{1F7ECC23-A5A0-44D4-B496-B55A434D5385}" type="datetime1">
+              <a:rPr lang="en-US" smtClean="0"/>
               <a:t>8/17/2024</a:t>
             </a:fld>
             <a:endParaRPr lang="en-US" dirty="0"/>
@@ -1120,6 +1484,10 @@
           <a:bodyPr/>
           <a:lstStyle/>
           <a:p>
+            <a:r>
+              <a:rPr lang="fr-CH"/>
+              <a:t>Présentation BA - Chatbot Réservation - Rodrigues dos Santos Fabio</a:t>
+            </a:r>
             <a:endParaRPr lang="en-US" dirty="0"/>
           </a:p>
         </p:txBody>
@@ -1381,9 +1749,8 @@
           <a:bodyPr/>
           <a:lstStyle/>
           <a:p>
-            <a:fld id="{5586B75A-687E-405C-8A0B-8D00578BA2C3}" type="datetimeFigureOut">
-              <a:rPr lang="en-US" dirty="0"/>
-              <a:pPr/>
+            <a:fld id="{337DEE0E-910E-4647-A748-0A8F2A962DCA}" type="datetime1">
+              <a:rPr lang="en-US" smtClean="0"/>
               <a:t>8/17/2024</a:t>
             </a:fld>
             <a:endParaRPr lang="en-US" dirty="0"/>
@@ -1405,6 +1772,10 @@
           <a:bodyPr/>
           <a:lstStyle/>
           <a:p>
+            <a:r>
+              <a:rPr lang="fr-CH"/>
+              <a:t>Présentation BA - Chatbot Réservation - Rodrigues dos Santos Fabio</a:t>
+            </a:r>
             <a:endParaRPr lang="en-US" dirty="0"/>
           </a:p>
         </p:txBody>
@@ -1820,9 +2191,8 @@
           <a:bodyPr/>
           <a:lstStyle/>
           <a:p>
-            <a:fld id="{5586B75A-687E-405C-8A0B-8D00578BA2C3}" type="datetimeFigureOut">
-              <a:rPr lang="en-US" dirty="0"/>
-              <a:pPr/>
+            <a:fld id="{E2F9AEDB-DA47-42B1-AA20-FA4193278BFB}" type="datetime1">
+              <a:rPr lang="en-US" smtClean="0"/>
               <a:t>8/17/2024</a:t>
             </a:fld>
             <a:endParaRPr lang="en-US" dirty="0"/>
@@ -1844,6 +2214,10 @@
           <a:bodyPr/>
           <a:lstStyle/>
           <a:p>
+            <a:r>
+              <a:rPr lang="fr-CH"/>
+              <a:t>Présentation BA - Chatbot Réservation - Rodrigues dos Santos Fabio</a:t>
+            </a:r>
             <a:endParaRPr lang="en-US" dirty="0"/>
           </a:p>
         </p:txBody>
@@ -1935,9 +2309,8 @@
           <a:bodyPr/>
           <a:lstStyle/>
           <a:p>
-            <a:fld id="{5586B75A-687E-405C-8A0B-8D00578BA2C3}" type="datetimeFigureOut">
-              <a:rPr lang="en-US" dirty="0"/>
-              <a:pPr/>
+            <a:fld id="{76A3806D-CEFF-4C7C-B69E-E8C6C2135F0C}" type="datetime1">
+              <a:rPr lang="en-US" smtClean="0"/>
               <a:t>8/17/2024</a:t>
             </a:fld>
             <a:endParaRPr lang="en-US" dirty="0"/>
@@ -1959,6 +2332,10 @@
           <a:bodyPr/>
           <a:lstStyle/>
           <a:p>
+            <a:r>
+              <a:rPr lang="fr-CH"/>
+              <a:t>Présentation BA - Chatbot Réservation - Rodrigues dos Santos Fabio</a:t>
+            </a:r>
             <a:endParaRPr lang="en-US" dirty="0"/>
           </a:p>
         </p:txBody>
@@ -2027,9 +2404,8 @@
           <a:bodyPr/>
           <a:lstStyle/>
           <a:p>
-            <a:fld id="{5586B75A-687E-405C-8A0B-8D00578BA2C3}" type="datetimeFigureOut">
-              <a:rPr lang="en-US" dirty="0"/>
-              <a:pPr/>
+            <a:fld id="{6C799852-6437-4F59-8BA4-BD526AE7B018}" type="datetime1">
+              <a:rPr lang="en-US" smtClean="0"/>
               <a:t>8/17/2024</a:t>
             </a:fld>
             <a:endParaRPr lang="en-US" dirty="0"/>
@@ -2051,6 +2427,10 @@
           <a:bodyPr/>
           <a:lstStyle/>
           <a:p>
+            <a:r>
+              <a:rPr lang="fr-CH"/>
+              <a:t>Présentation BA - Chatbot Réservation - Rodrigues dos Santos Fabio</a:t>
+            </a:r>
             <a:endParaRPr lang="en-US" dirty="0"/>
           </a:p>
         </p:txBody>
@@ -2312,9 +2692,8 @@
           <a:bodyPr/>
           <a:lstStyle/>
           <a:p>
-            <a:fld id="{5586B75A-687E-405C-8A0B-8D00578BA2C3}" type="datetimeFigureOut">
-              <a:rPr lang="en-US" dirty="0"/>
-              <a:pPr/>
+            <a:fld id="{BF0EB050-0ECA-42EF-A435-70711370D85B}" type="datetime1">
+              <a:rPr lang="en-US" smtClean="0"/>
               <a:t>8/17/2024</a:t>
             </a:fld>
             <a:endParaRPr lang="en-US" dirty="0"/>
@@ -2336,6 +2715,10 @@
           <a:bodyPr/>
           <a:lstStyle/>
           <a:p>
+            <a:r>
+              <a:rPr lang="fr-CH"/>
+              <a:t>Présentation BA - Chatbot Réservation - Rodrigues dos Santos Fabio</a:t>
+            </a:r>
             <a:endParaRPr lang="en-US" dirty="0"/>
           </a:p>
         </p:txBody>
@@ -2582,9 +2965,8 @@
           <a:bodyPr/>
           <a:lstStyle/>
           <a:p>
-            <a:fld id="{5586B75A-687E-405C-8A0B-8D00578BA2C3}" type="datetimeFigureOut">
-              <a:rPr lang="en-US" dirty="0"/>
-              <a:pPr/>
+            <a:fld id="{F4052ABD-58D4-4C9E-B1B8-CEC2AA8DBD93}" type="datetime1">
+              <a:rPr lang="en-US" smtClean="0"/>
               <a:t>8/17/2024</a:t>
             </a:fld>
             <a:endParaRPr lang="en-US" dirty="0"/>
@@ -2611,6 +2993,10 @@
           <a:bodyPr/>
           <a:lstStyle/>
           <a:p>
+            <a:r>
+              <a:rPr lang="fr-CH"/>
+              <a:t>Présentation BA - Chatbot Réservation - Rodrigues dos Santos Fabio</a:t>
+            </a:r>
             <a:endParaRPr lang="en-US" dirty="0"/>
           </a:p>
         </p:txBody>
@@ -2876,9 +3262,8 @@
             </a:lvl1pPr>
           </a:lstStyle>
           <a:p>
-            <a:fld id="{5586B75A-687E-405C-8A0B-8D00578BA2C3}" type="datetimeFigureOut">
-              <a:rPr lang="en-US" dirty="0"/>
-              <a:pPr/>
+            <a:fld id="{C4EEF54E-F662-454E-AE7D-91A1E3F52308}" type="datetime1">
+              <a:rPr lang="en-US" smtClean="0"/>
               <a:t>8/17/2024</a:t>
             </a:fld>
             <a:endParaRPr lang="en-US" dirty="0"/>
@@ -2919,6 +3304,10 @@
             </a:lvl1pPr>
           </a:lstStyle>
           <a:p>
+            <a:r>
+              <a:rPr lang="fr-CH"/>
+              <a:t>Présentation BA - Chatbot Réservation - Rodrigues dos Santos Fabio</a:t>
+            </a:r>
             <a:endParaRPr lang="en-US" dirty="0"/>
           </a:p>
         </p:txBody>
@@ -2979,7 +3368,7 @@
     <p:sldLayoutId id="2147483850" r:id="rId10"/>
     <p:sldLayoutId id="2147483851" r:id="rId11"/>
   </p:sldLayoutIdLst>
-  <p:hf sldNum="0" hdr="0" ftr="0" dt="0"/>
+  <p:hf hdr="0" dt="0"/>
   <p:txStyles>
     <p:titleStyle>
       <a:lvl1pPr algn="l" defTabSz="914400" rtl="0" eaLnBrk="1" latinLnBrk="0" hangingPunct="1">
@@ -3835,6 +4224,65 @@
           </a:p>
         </p:txBody>
       </p:sp>
+      <p:sp>
+        <p:nvSpPr>
+          <p:cNvPr id="10" name="Espace réservé du pied de page 9">
+            <a:extLst>
+              <a:ext uri="{FF2B5EF4-FFF2-40B4-BE49-F238E27FC236}">
+                <a16:creationId xmlns:a16="http://schemas.microsoft.com/office/drawing/2014/main" id="{DD4D5C53-4E19-C45C-A7EF-80A1917568CF}"/>
+              </a:ext>
+            </a:extLst>
+          </p:cNvPr>
+          <p:cNvSpPr>
+            <a:spLocks noGrp="1"/>
+          </p:cNvSpPr>
+          <p:nvPr>
+            <p:ph type="ftr" sz="quarter" idx="11"/>
+          </p:nvPr>
+        </p:nvSpPr>
+        <p:spPr/>
+        <p:txBody>
+          <a:bodyPr/>
+          <a:lstStyle/>
+          <a:p>
+            <a:r>
+              <a:rPr lang="fr-CH"/>
+              <a:t>Présentation BA - Chatbot Réservation - Rodrigues dos Santos Fabio</a:t>
+            </a:r>
+            <a:endParaRPr lang="en-US" dirty="0"/>
+          </a:p>
+        </p:txBody>
+      </p:sp>
+      <p:sp>
+        <p:nvSpPr>
+          <p:cNvPr id="11" name="Espace réservé du numéro de diapositive 10">
+            <a:extLst>
+              <a:ext uri="{FF2B5EF4-FFF2-40B4-BE49-F238E27FC236}">
+                <a16:creationId xmlns:a16="http://schemas.microsoft.com/office/drawing/2014/main" id="{CC8AA71E-6A37-272E-AF57-38BD43C9D871}"/>
+              </a:ext>
+            </a:extLst>
+          </p:cNvPr>
+          <p:cNvSpPr>
+            <a:spLocks noGrp="1"/>
+          </p:cNvSpPr>
+          <p:nvPr>
+            <p:ph type="sldNum" sz="quarter" idx="12"/>
+          </p:nvPr>
+        </p:nvSpPr>
+        <p:spPr/>
+        <p:txBody>
+          <a:bodyPr/>
+          <a:lstStyle/>
+          <a:p>
+            <a:fld id="{4FAB73BC-B049-4115-A692-8D63A059BFB8}" type="slidenum">
+              <a:rPr lang="en-US" smtClean="0"/>
+              <a:pPr/>
+              <a:t>1</a:t>
+            </a:fld>
+            <a:endParaRPr lang="en-US" dirty="0"/>
+          </a:p>
+        </p:txBody>
+      </p:sp>
     </p:spTree>
     <p:extLst>
       <p:ext uri="{BB962C8B-B14F-4D97-AF65-F5344CB8AC3E}">
@@ -3886,7 +4334,11 @@
           <a:bodyPr/>
           <a:lstStyle/>
           <a:p>
-            <a:endParaRPr lang="fr-CH"/>
+            <a:r>
+              <a:rPr lang="fr-CH" sz="4400" dirty="0"/>
+              <a:t>Contexte</a:t>
+            </a:r>
+            <a:endParaRPr lang="fr-CH" dirty="0"/>
           </a:p>
         </p:txBody>
       </p:sp>
@@ -3911,7 +4363,158 @@
           <a:bodyPr/>
           <a:lstStyle/>
           <a:p>
-            <a:endParaRPr lang="fr-CH"/>
+            <a:pPr>
+              <a:buFont typeface="Arial" panose="020B0604020202020204" pitchFamily="34" charset="0"/>
+              <a:buChar char="•"/>
+            </a:pPr>
+            <a:r>
+              <a:rPr lang="fr-CH" dirty="0"/>
+              <a:t>Projet réalisé dans le cadre du travail de </a:t>
+            </a:r>
+            <a:r>
+              <a:rPr lang="fr-CH" dirty="0" err="1"/>
+              <a:t>Bachelor</a:t>
+            </a:r>
+            <a:endParaRPr lang="fr-CH" dirty="0"/>
+          </a:p>
+          <a:p>
+            <a:pPr>
+              <a:buFont typeface="Arial" panose="020B0604020202020204" pitchFamily="34" charset="0"/>
+              <a:buChar char="•"/>
+            </a:pPr>
+            <a:r>
+              <a:rPr lang="fr-CH" dirty="0"/>
+              <a:t>Idée de projet initiale par M. </a:t>
+            </a:r>
+            <a:r>
+              <a:rPr lang="fr-CH" dirty="0" err="1"/>
+              <a:t>Niklaus</a:t>
+            </a:r>
+            <a:r>
+              <a:rPr lang="fr-CH" dirty="0"/>
+              <a:t> </a:t>
+            </a:r>
+            <a:r>
+              <a:rPr lang="fr-CH" dirty="0" err="1"/>
+              <a:t>Eggenberg</a:t>
+            </a:r>
+            <a:endParaRPr lang="fr-CH" dirty="0"/>
+          </a:p>
+          <a:p>
+            <a:pPr>
+              <a:buFont typeface="Arial" panose="020B0604020202020204" pitchFamily="34" charset="0"/>
+              <a:buChar char="•"/>
+            </a:pPr>
+            <a:r>
+              <a:rPr lang="fr-CH" dirty="0"/>
+              <a:t>Bot de réservation conversationnel</a:t>
+            </a:r>
+          </a:p>
+          <a:p>
+            <a:pPr lvl="1">
+              <a:lnSpc>
+                <a:spcPct val="150000"/>
+              </a:lnSpc>
+              <a:buFont typeface="Courier New" panose="02070309020205020404" pitchFamily="49" charset="0"/>
+              <a:buChar char="o"/>
+            </a:pPr>
+            <a:r>
+              <a:rPr lang="fr-CH" dirty="0"/>
+              <a:t>Complément/ajout à un système existant de réservation</a:t>
+            </a:r>
+          </a:p>
+          <a:p>
+            <a:pPr lvl="1">
+              <a:lnSpc>
+                <a:spcPct val="150000"/>
+              </a:lnSpc>
+              <a:buFont typeface="Courier New" panose="02070309020205020404" pitchFamily="49" charset="0"/>
+              <a:buChar char="o"/>
+            </a:pPr>
+            <a:endParaRPr lang="fr-CH" dirty="0"/>
+          </a:p>
+          <a:p>
+            <a:pPr lvl="1">
+              <a:lnSpc>
+                <a:spcPct val="150000"/>
+              </a:lnSpc>
+              <a:buFont typeface="Courier New" panose="02070309020205020404" pitchFamily="49" charset="0"/>
+              <a:buChar char="o"/>
+            </a:pPr>
+            <a:endParaRPr lang="fr-CH" dirty="0"/>
+          </a:p>
+          <a:p>
+            <a:pPr lvl="1">
+              <a:buFont typeface="Courier New" panose="02070309020205020404" pitchFamily="49" charset="0"/>
+              <a:buChar char="o"/>
+            </a:pPr>
+            <a:endParaRPr lang="fr-CH" dirty="0"/>
+          </a:p>
+          <a:p>
+            <a:pPr>
+              <a:buFont typeface="Arial" panose="020B0604020202020204" pitchFamily="34" charset="0"/>
+              <a:buChar char="•"/>
+            </a:pPr>
+            <a:endParaRPr lang="fr-CH" dirty="0"/>
+          </a:p>
+        </p:txBody>
+      </p:sp>
+      <p:sp>
+        <p:nvSpPr>
+          <p:cNvPr id="4" name="Espace réservé du pied de page 3">
+            <a:extLst>
+              <a:ext uri="{FF2B5EF4-FFF2-40B4-BE49-F238E27FC236}">
+                <a16:creationId xmlns:a16="http://schemas.microsoft.com/office/drawing/2014/main" id="{0F17B811-EEE8-9F17-0919-33990C1D517A}"/>
+              </a:ext>
+            </a:extLst>
+          </p:cNvPr>
+          <p:cNvSpPr>
+            <a:spLocks noGrp="1"/>
+          </p:cNvSpPr>
+          <p:nvPr>
+            <p:ph type="ftr" sz="quarter" idx="11"/>
+          </p:nvPr>
+        </p:nvSpPr>
+        <p:spPr/>
+        <p:txBody>
+          <a:bodyPr/>
+          <a:lstStyle/>
+          <a:p>
+            <a:r>
+              <a:rPr lang="fr-CH"/>
+              <a:t>Présentation BA - Chatbot Réservation - Rodrigues dos Santos Fabio</a:t>
+            </a:r>
+            <a:endParaRPr lang="en-US" dirty="0"/>
+          </a:p>
+        </p:txBody>
+      </p:sp>
+      <p:sp>
+        <p:nvSpPr>
+          <p:cNvPr id="5" name="Espace réservé du numéro de diapositive 4">
+            <a:extLst>
+              <a:ext uri="{FF2B5EF4-FFF2-40B4-BE49-F238E27FC236}">
+                <a16:creationId xmlns:a16="http://schemas.microsoft.com/office/drawing/2014/main" id="{6901B04D-6E8F-5582-B597-B5B902DEF230}"/>
+              </a:ext>
+            </a:extLst>
+          </p:cNvPr>
+          <p:cNvSpPr>
+            <a:spLocks noGrp="1"/>
+          </p:cNvSpPr>
+          <p:nvPr>
+            <p:ph type="sldNum" sz="quarter" idx="12"/>
+          </p:nvPr>
+        </p:nvSpPr>
+        <p:spPr/>
+        <p:txBody>
+          <a:bodyPr/>
+          <a:lstStyle/>
+          <a:p>
+            <a:fld id="{4FAB73BC-B049-4115-A692-8D63A059BFB8}" type="slidenum">
+              <a:rPr lang="en-US" smtClean="0"/>
+              <a:pPr/>
+              <a:t>2</a:t>
+            </a:fld>
+            <a:endParaRPr lang="en-US" dirty="0"/>
           </a:p>
         </p:txBody>
       </p:sp>
@@ -4157,4 +4760,319 @@
     </a:ext>
   </a:extLst>
 </a:theme>
+</file>
+
+<file path=ppt/theme/theme2.xml><?xml version="1.0" encoding="utf-8"?>
+<a:theme xmlns:a="http://schemas.openxmlformats.org/drawingml/2006/main" name="Thème Office">
+  <a:themeElements>
+    <a:clrScheme name="Office">
+      <a:dk1>
+        <a:sysClr val="windowText" lastClr="000000"/>
+      </a:dk1>
+      <a:lt1>
+        <a:sysClr val="window" lastClr="FFFFFF"/>
+      </a:lt1>
+      <a:dk2>
+        <a:srgbClr val="0E2841"/>
+      </a:dk2>
+      <a:lt2>
+        <a:srgbClr val="E8E8E8"/>
+      </a:lt2>
+      <a:accent1>
+        <a:srgbClr val="156082"/>
+      </a:accent1>
+      <a:accent2>
+        <a:srgbClr val="E97132"/>
+      </a:accent2>
+      <a:accent3>
+        <a:srgbClr val="196B24"/>
+      </a:accent3>
+      <a:accent4>
+        <a:srgbClr val="0F9ED5"/>
+      </a:accent4>
+      <a:accent5>
+        <a:srgbClr val="A02B93"/>
+      </a:accent5>
+      <a:accent6>
+        <a:srgbClr val="4EA72E"/>
+      </a:accent6>
+      <a:hlink>
+        <a:srgbClr val="467886"/>
+      </a:hlink>
+      <a:folHlink>
+        <a:srgbClr val="96607D"/>
+      </a:folHlink>
+    </a:clrScheme>
+    <a:fontScheme name="Office">
+      <a:majorFont>
+        <a:latin typeface="Aptos Display" panose="02110004020202020204"/>
+        <a:ea typeface=""/>
+        <a:cs typeface=""/>
+        <a:font script="Jpan" typeface="游ゴシック Light"/>
+        <a:font script="Hang" typeface="맑은 고딕"/>
+        <a:font script="Hans" typeface="等线 Light"/>
+        <a:font script="Hant" typeface="新細明體"/>
+        <a:font script="Arab" typeface="Times New Roman"/>
+        <a:font script="Hebr" typeface="Times New Roman"/>
+        <a:font script="Thai" typeface="Angsana New"/>
+        <a:font script="Ethi" typeface="Nyala"/>
+        <a:font script="Beng" typeface="Vrinda"/>
+        <a:font script="Gujr" typeface="Shruti"/>
+        <a:font script="Khmr" typeface="MoolBoran"/>
+        <a:font script="Knda" typeface="Tunga"/>
+        <a:font script="Guru" typeface="Raavi"/>
+        <a:font script="Cans" typeface="Euphemia"/>
+        <a:font script="Cher" typeface="Plantagenet Cherokee"/>
+        <a:font script="Yiii" typeface="Microsoft Yi Baiti"/>
+        <a:font script="Tibt" typeface="Microsoft Himalaya"/>
+        <a:font script="Thaa" typeface="MV Boli"/>
+        <a:font script="Deva" typeface="Mangal"/>
+        <a:font script="Telu" typeface="Gautami"/>
+        <a:font script="Taml" typeface="Latha"/>
+        <a:font script="Syrc" typeface="Estrangelo Edessa"/>
+        <a:font script="Orya" typeface="Kalinga"/>
+        <a:font script="Mlym" typeface="Kartika"/>
+        <a:font script="Laoo" typeface="DokChampa"/>
+        <a:font script="Sinh" typeface="Iskoola Pota"/>
+        <a:font script="Mong" typeface="Mongolian Baiti"/>
+        <a:font script="Viet" typeface="Times New Roman"/>
+        <a:font script="Uigh" typeface="Microsoft Uighur"/>
+        <a:font script="Geor" typeface="Sylfaen"/>
+        <a:font script="Armn" typeface="Arial"/>
+        <a:font script="Bugi" typeface="Leelawadee UI"/>
+        <a:font script="Bopo" typeface="Microsoft JhengHei"/>
+        <a:font script="Java" typeface="Javanese Text"/>
+        <a:font script="Lisu" typeface="Segoe UI"/>
+        <a:font script="Mymr" typeface="Myanmar Text"/>
+        <a:font script="Nkoo" typeface="Ebrima"/>
+        <a:font script="Olck" typeface="Nirmala UI"/>
+        <a:font script="Osma" typeface="Ebrima"/>
+        <a:font script="Phag" typeface="Phagspa"/>
+        <a:font script="Syrn" typeface="Estrangelo Edessa"/>
+        <a:font script="Syrj" typeface="Estrangelo Edessa"/>
+        <a:font script="Syre" typeface="Estrangelo Edessa"/>
+        <a:font script="Sora" typeface="Nirmala UI"/>
+        <a:font script="Tale" typeface="Microsoft Tai Le"/>
+        <a:font script="Talu" typeface="Microsoft New Tai Lue"/>
+        <a:font script="Tfng" typeface="Ebrima"/>
+      </a:majorFont>
+      <a:minorFont>
+        <a:latin typeface="Aptos" panose="02110004020202020204"/>
+        <a:ea typeface=""/>
+        <a:cs typeface=""/>
+        <a:font script="Jpan" typeface="游ゴシック"/>
+        <a:font script="Hang" typeface="맑은 고딕"/>
+        <a:font script="Hans" typeface="等线"/>
+        <a:font script="Hant" typeface="新細明體"/>
+        <a:font script="Arab" typeface="Arial"/>
+        <a:font script="Hebr" typeface="Arial"/>
+        <a:font script="Thai" typeface="Cordia New"/>
+        <a:font script="Ethi" typeface="Nyala"/>
+        <a:font script="Beng" typeface="Vrinda"/>
+        <a:font script="Gujr" typeface="Shruti"/>
+        <a:font script="Khmr" typeface="DaunPenh"/>
+        <a:font script="Knda" typeface="Tunga"/>
+        <a:font script="Guru" typeface="Raavi"/>
+        <a:font script="Cans" typeface="Euphemia"/>
+        <a:font script="Cher" typeface="Plantagenet Cherokee"/>
+        <a:font script="Yiii" typeface="Microsoft Yi Baiti"/>
+        <a:font script="Tibt" typeface="Microsoft Himalaya"/>
+        <a:font script="Thaa" typeface="MV Boli"/>
+        <a:font script="Deva" typeface="Mangal"/>
+        <a:font script="Telu" typeface="Gautami"/>
+        <a:font script="Taml" typeface="Latha"/>
+        <a:font script="Syrc" typeface="Estrangelo Edessa"/>
+        <a:font script="Orya" typeface="Kalinga"/>
+        <a:font script="Mlym" typeface="Kartika"/>
+        <a:font script="Laoo" typeface="DokChampa"/>
+        <a:font script="Sinh" typeface="Iskoola Pota"/>
+        <a:font script="Mong" typeface="Mongolian Baiti"/>
+        <a:font script="Viet" typeface="Arial"/>
+        <a:font script="Uigh" typeface="Microsoft Uighur"/>
+        <a:font script="Geor" typeface="Sylfaen"/>
+        <a:font script="Armn" typeface="Arial"/>
+        <a:font script="Bugi" typeface="Leelawadee UI"/>
+        <a:font script="Bopo" typeface="Microsoft JhengHei"/>
+        <a:font script="Java" typeface="Javanese Text"/>
+        <a:font script="Lisu" typeface="Segoe UI"/>
+        <a:font script="Mymr" typeface="Myanmar Text"/>
+        <a:font script="Nkoo" typeface="Ebrima"/>
+        <a:font script="Olck" typeface="Nirmala UI"/>
+        <a:font script="Osma" typeface="Ebrima"/>
+        <a:font script="Phag" typeface="Phagspa"/>
+        <a:font script="Syrn" typeface="Estrangelo Edessa"/>
+        <a:font script="Syrj" typeface="Estrangelo Edessa"/>
+        <a:font script="Syre" typeface="Estrangelo Edessa"/>
+        <a:font script="Sora" typeface="Nirmala UI"/>
+        <a:font script="Tale" typeface="Microsoft Tai Le"/>
+        <a:font script="Talu" typeface="Microsoft New Tai Lue"/>
+        <a:font script="Tfng" typeface="Ebrima"/>
+      </a:minorFont>
+    </a:fontScheme>
+    <a:fmtScheme name="Office">
+      <a:fillStyleLst>
+        <a:solidFill>
+          <a:schemeClr val="phClr"/>
+        </a:solidFill>
+        <a:gradFill rotWithShape="1">
+          <a:gsLst>
+            <a:gs pos="0">
+              <a:schemeClr val="phClr">
+                <a:lumMod val="110000"/>
+                <a:satMod val="105000"/>
+                <a:tint val="67000"/>
+              </a:schemeClr>
+            </a:gs>
+            <a:gs pos="50000">
+              <a:schemeClr val="phClr">
+                <a:lumMod val="105000"/>
+                <a:satMod val="103000"/>
+                <a:tint val="73000"/>
+              </a:schemeClr>
+            </a:gs>
+            <a:gs pos="100000">
+              <a:schemeClr val="phClr">
+                <a:lumMod val="105000"/>
+                <a:satMod val="109000"/>
+                <a:tint val="81000"/>
+              </a:schemeClr>
+            </a:gs>
+          </a:gsLst>
+          <a:lin ang="5400000" scaled="0"/>
+        </a:gradFill>
+        <a:gradFill rotWithShape="1">
+          <a:gsLst>
+            <a:gs pos="0">
+              <a:schemeClr val="phClr">
+                <a:satMod val="103000"/>
+                <a:lumMod val="102000"/>
+                <a:tint val="94000"/>
+              </a:schemeClr>
+            </a:gs>
+            <a:gs pos="50000">
+              <a:schemeClr val="phClr">
+                <a:satMod val="110000"/>
+                <a:lumMod val="100000"/>
+                <a:shade val="100000"/>
+              </a:schemeClr>
+            </a:gs>
+            <a:gs pos="100000">
+              <a:schemeClr val="phClr">
+                <a:lumMod val="99000"/>
+                <a:satMod val="120000"/>
+                <a:shade val="78000"/>
+              </a:schemeClr>
+            </a:gs>
+          </a:gsLst>
+          <a:lin ang="5400000" scaled="0"/>
+        </a:gradFill>
+      </a:fillStyleLst>
+      <a:lnStyleLst>
+        <a:ln w="12700" cap="flat" cmpd="sng" algn="ctr">
+          <a:solidFill>
+            <a:schemeClr val="phClr"/>
+          </a:solidFill>
+          <a:prstDash val="solid"/>
+          <a:miter lim="800000"/>
+        </a:ln>
+        <a:ln w="19050" cap="flat" cmpd="sng" algn="ctr">
+          <a:solidFill>
+            <a:schemeClr val="phClr"/>
+          </a:solidFill>
+          <a:prstDash val="solid"/>
+          <a:miter lim="800000"/>
+        </a:ln>
+        <a:ln w="25400" cap="flat" cmpd="sng" algn="ctr">
+          <a:solidFill>
+            <a:schemeClr val="phClr"/>
+          </a:solidFill>
+          <a:prstDash val="solid"/>
+          <a:miter lim="800000"/>
+        </a:ln>
+      </a:lnStyleLst>
+      <a:effectStyleLst>
+        <a:effectStyle>
+          <a:effectLst/>
+        </a:effectStyle>
+        <a:effectStyle>
+          <a:effectLst/>
+        </a:effectStyle>
+        <a:effectStyle>
+          <a:effectLst>
+            <a:outerShdw blurRad="57150" dist="19050" dir="5400000" algn="ctr" rotWithShape="0">
+              <a:srgbClr val="000000">
+                <a:alpha val="63000"/>
+              </a:srgbClr>
+            </a:outerShdw>
+          </a:effectLst>
+        </a:effectStyle>
+      </a:effectStyleLst>
+      <a:bgFillStyleLst>
+        <a:solidFill>
+          <a:schemeClr val="phClr"/>
+        </a:solidFill>
+        <a:solidFill>
+          <a:schemeClr val="phClr">
+            <a:tint val="95000"/>
+            <a:satMod val="170000"/>
+          </a:schemeClr>
+        </a:solidFill>
+        <a:gradFill rotWithShape="1">
+          <a:gsLst>
+            <a:gs pos="0">
+              <a:schemeClr val="phClr">
+                <a:tint val="93000"/>
+                <a:satMod val="150000"/>
+                <a:shade val="98000"/>
+                <a:lumMod val="102000"/>
+              </a:schemeClr>
+            </a:gs>
+            <a:gs pos="50000">
+              <a:schemeClr val="phClr">
+                <a:tint val="98000"/>
+                <a:satMod val="130000"/>
+                <a:shade val="90000"/>
+                <a:lumMod val="103000"/>
+              </a:schemeClr>
+            </a:gs>
+            <a:gs pos="100000">
+              <a:schemeClr val="phClr">
+                <a:shade val="63000"/>
+                <a:satMod val="120000"/>
+              </a:schemeClr>
+            </a:gs>
+          </a:gsLst>
+          <a:lin ang="5400000" scaled="0"/>
+        </a:gradFill>
+      </a:bgFillStyleLst>
+    </a:fmtScheme>
+  </a:themeElements>
+  <a:objectDefaults>
+    <a:lnDef>
+      <a:spPr/>
+      <a:bodyPr/>
+      <a:lstStyle/>
+      <a:style>
+        <a:lnRef idx="2">
+          <a:schemeClr val="accent1"/>
+        </a:lnRef>
+        <a:fillRef idx="0">
+          <a:schemeClr val="accent1"/>
+        </a:fillRef>
+        <a:effectRef idx="1">
+          <a:schemeClr val="accent1"/>
+        </a:effectRef>
+        <a:fontRef idx="minor">
+          <a:schemeClr val="tx1"/>
+        </a:fontRef>
+      </a:style>
+    </a:lnDef>
+  </a:objectDefaults>
+  <a:extraClrSchemeLst/>
+  <a:extLst>
+    <a:ext uri="{05A4C25C-085E-4340-85A3-A5531E510DB2}">
+      <thm15:themeFamily xmlns:thm15="http://schemas.microsoft.com/office/thememl/2012/main" name="Office Theme" id="{2E142A2C-CD16-42D6-873A-C26D2A0506FA}" vid="{1BDDFF52-6CD6-40A5-AB3C-68EB2F1E4D0A}"/>
+    </a:ext>
+  </a:extLst>
+</a:theme>
 </file>
</xml_diff>

<commit_message>
màj présentation, partie rasa
</commit_message>
<xml_diff>
--- a/documentation/travail_bachelor/ISC_LOG_presentation_diplome_RodriguesDosSantosFabio_EggenbergNiklaus_2024.pptx
+++ b/documentation/travail_bachelor/ISC_LOG_presentation_diplome_RodriguesDosSantosFabio_EggenbergNiklaus_2024.pptx
@@ -5,7 +5,7 @@
     <p:sldMasterId id="2147483840" r:id="rId1"/>
   </p:sldMasterIdLst>
   <p:notesMasterIdLst>
-    <p:notesMasterId r:id="rId15"/>
+    <p:notesMasterId r:id="rId19"/>
   </p:notesMasterIdLst>
   <p:sldIdLst>
     <p:sldId id="256" r:id="rId2"/>
@@ -20,7 +20,11 @@
     <p:sldId id="264" r:id="rId11"/>
     <p:sldId id="267" r:id="rId12"/>
     <p:sldId id="270" r:id="rId13"/>
-    <p:sldId id="268" r:id="rId14"/>
+    <p:sldId id="271" r:id="rId14"/>
+    <p:sldId id="273" r:id="rId15"/>
+    <p:sldId id="272" r:id="rId16"/>
+    <p:sldId id="274" r:id="rId17"/>
+    <p:sldId id="268" r:id="rId18"/>
   </p:sldIdLst>
   <p:sldSz cx="12192000" cy="6858000"/>
   <p:notesSz cx="6858000" cy="9144000"/>
@@ -209,7 +213,7 @@
           <a:p>
             <a:fld id="{42AC3142-495C-4280-881B-1526FF75665B}" type="datetimeFigureOut">
               <a:rPr lang="fr-CH" smtClean="0"/>
-              <a:t>23.08.2024</a:t>
+              <a:t>24.08.2024</a:t>
             </a:fld>
             <a:endParaRPr lang="fr-CH"/>
           </a:p>
@@ -701,7 +705,7 @@
           <a:p>
             <a:fld id="{697BC7A4-560B-4424-86D9-D529C3ED2E24}" type="datetime1">
               <a:rPr lang="en-US" smtClean="0"/>
-              <a:t>8/23/2024</a:t>
+              <a:t>8/24/2024</a:t>
             </a:fld>
             <a:endParaRPr lang="en-US" dirty="0"/>
           </a:p>
@@ -871,7 +875,7 @@
           <a:p>
             <a:fld id="{6E901063-52CC-4584-9EE9-3A5FBF2927BA}" type="datetime1">
               <a:rPr lang="en-US" smtClean="0"/>
-              <a:t>8/23/2024</a:t>
+              <a:t>8/24/2024</a:t>
             </a:fld>
             <a:endParaRPr lang="en-US" dirty="0"/>
           </a:p>
@@ -1051,7 +1055,7 @@
           <a:p>
             <a:fld id="{45B21167-5961-4EAA-A2C5-C443E1B8357A}" type="datetime1">
               <a:rPr lang="en-US" smtClean="0"/>
-              <a:t>8/23/2024</a:t>
+              <a:t>8/24/2024</a:t>
             </a:fld>
             <a:endParaRPr lang="en-US" dirty="0"/>
           </a:p>
@@ -1221,7 +1225,7 @@
           <a:p>
             <a:fld id="{77856CEA-0161-4B0B-A6F9-D90790302E09}" type="datetime1">
               <a:rPr lang="en-US" smtClean="0"/>
-              <a:t>8/23/2024</a:t>
+              <a:t>8/24/2024</a:t>
             </a:fld>
             <a:endParaRPr lang="en-US" dirty="0"/>
           </a:p>
@@ -1479,7 +1483,7 @@
           <a:p>
             <a:fld id="{1F7ECC23-A5A0-44D4-B496-B55A434D5385}" type="datetime1">
               <a:rPr lang="en-US" smtClean="0"/>
-              <a:t>8/23/2024</a:t>
+              <a:t>8/24/2024</a:t>
             </a:fld>
             <a:endParaRPr lang="en-US" dirty="0"/>
           </a:p>
@@ -1767,7 +1771,7 @@
           <a:p>
             <a:fld id="{337DEE0E-910E-4647-A748-0A8F2A962DCA}" type="datetime1">
               <a:rPr lang="en-US" smtClean="0"/>
-              <a:t>8/23/2024</a:t>
+              <a:t>8/24/2024</a:t>
             </a:fld>
             <a:endParaRPr lang="en-US" dirty="0"/>
           </a:p>
@@ -2209,7 +2213,7 @@
           <a:p>
             <a:fld id="{E2F9AEDB-DA47-42B1-AA20-FA4193278BFB}" type="datetime1">
               <a:rPr lang="en-US" smtClean="0"/>
-              <a:t>8/23/2024</a:t>
+              <a:t>8/24/2024</a:t>
             </a:fld>
             <a:endParaRPr lang="en-US" dirty="0"/>
           </a:p>
@@ -2327,7 +2331,7 @@
           <a:p>
             <a:fld id="{76A3806D-CEFF-4C7C-B69E-E8C6C2135F0C}" type="datetime1">
               <a:rPr lang="en-US" smtClean="0"/>
-              <a:t>8/23/2024</a:t>
+              <a:t>8/24/2024</a:t>
             </a:fld>
             <a:endParaRPr lang="en-US" dirty="0"/>
           </a:p>
@@ -2422,7 +2426,7 @@
           <a:p>
             <a:fld id="{6C799852-6437-4F59-8BA4-BD526AE7B018}" type="datetime1">
               <a:rPr lang="en-US" smtClean="0"/>
-              <a:t>8/23/2024</a:t>
+              <a:t>8/24/2024</a:t>
             </a:fld>
             <a:endParaRPr lang="en-US" dirty="0"/>
           </a:p>
@@ -2710,7 +2714,7 @@
           <a:p>
             <a:fld id="{BF0EB050-0ECA-42EF-A435-70711370D85B}" type="datetime1">
               <a:rPr lang="en-US" smtClean="0"/>
-              <a:t>8/23/2024</a:t>
+              <a:t>8/24/2024</a:t>
             </a:fld>
             <a:endParaRPr lang="en-US" dirty="0"/>
           </a:p>
@@ -2983,7 +2987,7 @@
           <a:p>
             <a:fld id="{F4052ABD-58D4-4C9E-B1B8-CEC2AA8DBD93}" type="datetime1">
               <a:rPr lang="en-US" smtClean="0"/>
-              <a:t>8/23/2024</a:t>
+              <a:t>8/24/2024</a:t>
             </a:fld>
             <a:endParaRPr lang="en-US" dirty="0"/>
           </a:p>
@@ -3280,7 +3284,7 @@
           <a:p>
             <a:fld id="{C4EEF54E-F662-454E-AE7D-91A1E3F52308}" type="datetime1">
               <a:rPr lang="en-US" smtClean="0"/>
-              <a:t>8/23/2024</a:t>
+              <a:t>8/24/2024</a:t>
             </a:fld>
             <a:endParaRPr lang="en-US" dirty="0"/>
           </a:p>
@@ -4348,7 +4352,7 @@
         <p:spPr>
           <a:xfrm>
             <a:off x="60385" y="1123837"/>
-            <a:ext cx="3286664" cy="4601183"/>
+            <a:ext cx="3372928" cy="4601183"/>
           </a:xfrm>
         </p:spPr>
         <p:txBody>
@@ -4357,7 +4361,7 @@
           <a:p>
             <a:r>
               <a:rPr lang="fr-CH" dirty="0"/>
-              <a:t>Fondements théoriques - NLU</a:t>
+              <a:t>Fondements théoriques – NLU </a:t>
             </a:r>
           </a:p>
         </p:txBody>
@@ -4523,8 +4527,8 @@
         </p:nvSpPr>
         <p:spPr>
           <a:xfrm>
-            <a:off x="60385" y="1123837"/>
-            <a:ext cx="3286664" cy="4601183"/>
+            <a:off x="60384" y="1123837"/>
+            <a:ext cx="3390181" cy="4601183"/>
           </a:xfrm>
         </p:spPr>
         <p:txBody>
@@ -4533,7 +4537,7 @@
           <a:p>
             <a:r>
               <a:rPr lang="fr-CH" dirty="0"/>
-              <a:t>Fondements théoriques - NLU</a:t>
+              <a:t>Fondements théoriques – NLU </a:t>
             </a:r>
           </a:p>
         </p:txBody>
@@ -4788,8 +4792,8 @@
         </p:nvSpPr>
         <p:spPr>
           <a:xfrm>
-            <a:off x="60385" y="1123837"/>
-            <a:ext cx="3286664" cy="4601183"/>
+            <a:off x="60384" y="1123837"/>
+            <a:ext cx="3493699" cy="4601183"/>
           </a:xfrm>
         </p:spPr>
         <p:txBody>
@@ -4798,7 +4802,7 @@
           <a:p>
             <a:r>
               <a:rPr lang="fr-CH" dirty="0"/>
-              <a:t>Fondements théoriques - Rasa</a:t>
+              <a:t>Fondements théoriques – Rasa </a:t>
             </a:r>
           </a:p>
         </p:txBody>
@@ -4821,18 +4825,48 @@
         </p:nvSpPr>
         <p:spPr>
           <a:xfrm>
-            <a:off x="3869268" y="1712863"/>
-            <a:ext cx="7315200" cy="3388715"/>
+            <a:off x="3729310" y="1730070"/>
+            <a:ext cx="4370541" cy="3388715"/>
           </a:xfrm>
         </p:spPr>
         <p:txBody>
-          <a:bodyPr/>
+          <a:bodyPr>
+            <a:normAutofit/>
+          </a:bodyPr>
           <a:lstStyle/>
           <a:p>
             <a:pPr marL="0" indent="0">
               <a:buNone/>
             </a:pPr>
-            <a:endParaRPr lang="fr-CH" dirty="0"/>
+            <a:r>
+              <a:rPr lang="fr-CH" sz="2800" b="1" dirty="0">
+                <a:latin typeface="+mj-lt"/>
+              </a:rPr>
+              <a:t>Qu’est-ce ?</a:t>
+            </a:r>
+          </a:p>
+          <a:p>
+            <a:pPr marL="0" indent="0">
+              <a:buNone/>
+            </a:pPr>
+            <a:r>
+              <a:rPr lang="fr-CH" dirty="0">
+                <a:latin typeface="+mj-lt"/>
+              </a:rPr>
+              <a:t>Un </a:t>
+            </a:r>
+            <a:r>
+              <a:rPr lang="fr-CH" dirty="0" err="1">
+                <a:latin typeface="+mj-lt"/>
+              </a:rPr>
+              <a:t>framework</a:t>
+            </a:r>
+            <a:r>
+              <a:rPr lang="fr-CH" dirty="0">
+                <a:latin typeface="+mj-lt"/>
+              </a:rPr>
+              <a:t> ou boîte à outils pour la création de Chatbots conversationnels en Python</a:t>
+            </a:r>
           </a:p>
         </p:txBody>
       </p:sp>
@@ -4892,6 +4926,80 @@
               <a:t>12</a:t>
             </a:fld>
             <a:endParaRPr lang="en-US" dirty="0"/>
+          </a:p>
+        </p:txBody>
+      </p:sp>
+      <p:pic>
+        <p:nvPicPr>
+          <p:cNvPr id="9" name="Image 8" descr="Une image contenant Graphique, capture d’écran, violet, Caractère coloré&#10;&#10;Description générée automatiquement">
+            <a:extLst>
+              <a:ext uri="{FF2B5EF4-FFF2-40B4-BE49-F238E27FC236}">
+                <a16:creationId xmlns:a16="http://schemas.microsoft.com/office/drawing/2014/main" id="{6860948F-7631-75DE-5A2A-BB8DDBC0C101}"/>
+              </a:ext>
+            </a:extLst>
+          </p:cNvPr>
+          <p:cNvPicPr>
+            <a:picLocks noChangeAspect="1"/>
+          </p:cNvPicPr>
+          <p:nvPr/>
+        </p:nvPicPr>
+        <p:blipFill>
+          <a:blip r:embed="rId2"/>
+          <a:stretch>
+            <a:fillRect/>
+          </a:stretch>
+        </p:blipFill>
+        <p:spPr>
+          <a:xfrm>
+            <a:off x="8099851" y="2529031"/>
+            <a:ext cx="3683189" cy="1790792"/>
+          </a:xfrm>
+          <a:prstGeom prst="rect">
+            <a:avLst/>
+          </a:prstGeom>
+        </p:spPr>
+      </p:pic>
+      <p:sp>
+        <p:nvSpPr>
+          <p:cNvPr id="10" name="ZoneTexte 9">
+            <a:extLst>
+              <a:ext uri="{FF2B5EF4-FFF2-40B4-BE49-F238E27FC236}">
+                <a16:creationId xmlns:a16="http://schemas.microsoft.com/office/drawing/2014/main" id="{3CCCE5A8-06F2-7D49-90E9-2249C97235AC}"/>
+              </a:ext>
+            </a:extLst>
+          </p:cNvPr>
+          <p:cNvSpPr txBox="1"/>
+          <p:nvPr/>
+        </p:nvSpPr>
+        <p:spPr>
+          <a:xfrm>
+            <a:off x="9084362" y="4092296"/>
+            <a:ext cx="1997127" cy="307777"/>
+          </a:xfrm>
+          <a:prstGeom prst="rect">
+            <a:avLst/>
+          </a:prstGeom>
+          <a:noFill/>
+        </p:spPr>
+        <p:txBody>
+          <a:bodyPr wrap="square" rtlCol="0">
+            <a:spAutoFit/>
+          </a:bodyPr>
+          <a:lstStyle/>
+          <a:p>
+            <a:r>
+              <a:rPr lang="fr-CH" sz="1400" dirty="0">
+                <a:solidFill>
+                  <a:schemeClr val="accent4"/>
+                </a:solidFill>
+              </a:rPr>
+              <a:t>Source: Rasa.com</a:t>
+            </a:r>
+            <a:endParaRPr lang="fr-CH" sz="1400" i="1" dirty="0">
+              <a:solidFill>
+                <a:schemeClr val="accent4"/>
+              </a:solidFill>
+            </a:endParaRPr>
           </a:p>
         </p:txBody>
       </p:sp>
@@ -4930,6 +5038,1482 @@
           <p:cNvPr id="2" name="Titre 1">
             <a:extLst>
               <a:ext uri="{FF2B5EF4-FFF2-40B4-BE49-F238E27FC236}">
+                <a16:creationId xmlns:a16="http://schemas.microsoft.com/office/drawing/2014/main" id="{64CB46EB-D775-0ADD-C2CB-933B0912081C}"/>
+              </a:ext>
+            </a:extLst>
+          </p:cNvPr>
+          <p:cNvSpPr>
+            <a:spLocks noGrp="1"/>
+          </p:cNvSpPr>
+          <p:nvPr>
+            <p:ph type="title"/>
+          </p:nvPr>
+        </p:nvSpPr>
+        <p:spPr>
+          <a:xfrm>
+            <a:off x="60384" y="1123837"/>
+            <a:ext cx="3528205" cy="4601183"/>
+          </a:xfrm>
+        </p:spPr>
+        <p:txBody>
+          <a:bodyPr/>
+          <a:lstStyle/>
+          <a:p>
+            <a:r>
+              <a:rPr lang="fr-CH" dirty="0"/>
+              <a:t>Fondements théoriques – Rasa </a:t>
+            </a:r>
+          </a:p>
+        </p:txBody>
+      </p:sp>
+      <p:sp>
+        <p:nvSpPr>
+          <p:cNvPr id="3" name="Espace réservé du contenu 2">
+            <a:extLst>
+              <a:ext uri="{FF2B5EF4-FFF2-40B4-BE49-F238E27FC236}">
+                <a16:creationId xmlns:a16="http://schemas.microsoft.com/office/drawing/2014/main" id="{1720EA06-7A2D-8774-FBC9-EC668D4A35A6}"/>
+              </a:ext>
+            </a:extLst>
+          </p:cNvPr>
+          <p:cNvSpPr>
+            <a:spLocks noGrp="1"/>
+          </p:cNvSpPr>
+          <p:nvPr>
+            <p:ph idx="1"/>
+          </p:nvPr>
+        </p:nvSpPr>
+        <p:spPr>
+          <a:xfrm>
+            <a:off x="3794624" y="778348"/>
+            <a:ext cx="6255150" cy="2646080"/>
+          </a:xfrm>
+        </p:spPr>
+        <p:txBody>
+          <a:bodyPr>
+            <a:normAutofit/>
+          </a:bodyPr>
+          <a:lstStyle/>
+          <a:p>
+            <a:pPr marL="0" indent="0">
+              <a:buNone/>
+            </a:pPr>
+            <a:r>
+              <a:rPr lang="fr-CH" sz="2800" b="1" dirty="0">
+                <a:latin typeface="+mj-lt"/>
+              </a:rPr>
+              <a:t>Services disponibles</a:t>
+            </a:r>
+          </a:p>
+          <a:p>
+            <a:pPr>
+              <a:buFont typeface="Arial" panose="020B0604020202020204" pitchFamily="34" charset="0"/>
+              <a:buChar char="•"/>
+            </a:pPr>
+            <a:r>
+              <a:rPr lang="fr-CH" dirty="0"/>
+              <a:t>Rasa </a:t>
+            </a:r>
+            <a:r>
+              <a:rPr lang="fr-CH" dirty="0" err="1"/>
+              <a:t>OpenSource</a:t>
+            </a:r>
+            <a:r>
+              <a:rPr lang="fr-CH" dirty="0"/>
+              <a:t> – Framework</a:t>
+            </a:r>
+          </a:p>
+          <a:p>
+            <a:pPr>
+              <a:buFont typeface="Arial" panose="020B0604020202020204" pitchFamily="34" charset="0"/>
+              <a:buChar char="•"/>
+            </a:pPr>
+            <a:r>
+              <a:rPr lang="fr-CH" dirty="0"/>
+              <a:t>Rasa X – Interface utilisateur pour manipuler le bot</a:t>
+            </a:r>
+          </a:p>
+          <a:p>
+            <a:pPr>
+              <a:buFont typeface="Arial" panose="020B0604020202020204" pitchFamily="34" charset="0"/>
+              <a:buChar char="•"/>
+            </a:pPr>
+            <a:r>
+              <a:rPr lang="fr-CH" dirty="0"/>
+              <a:t>Rasa Pro – Service proposant un complément d’IA comme intégration d’</a:t>
+            </a:r>
+            <a:r>
+              <a:rPr lang="fr-CH" dirty="0" err="1"/>
+              <a:t>OpenAI</a:t>
+            </a:r>
+            <a:r>
+              <a:rPr lang="fr-CH" dirty="0"/>
+              <a:t> par ex.</a:t>
+            </a:r>
+          </a:p>
+        </p:txBody>
+      </p:sp>
+      <p:sp>
+        <p:nvSpPr>
+          <p:cNvPr id="4" name="Espace réservé du pied de page 3">
+            <a:extLst>
+              <a:ext uri="{FF2B5EF4-FFF2-40B4-BE49-F238E27FC236}">
+                <a16:creationId xmlns:a16="http://schemas.microsoft.com/office/drawing/2014/main" id="{AE8E29F7-A8D9-B247-62A1-EE62F1806F60}"/>
+              </a:ext>
+            </a:extLst>
+          </p:cNvPr>
+          <p:cNvSpPr>
+            <a:spLocks noGrp="1"/>
+          </p:cNvSpPr>
+          <p:nvPr>
+            <p:ph type="ftr" sz="quarter" idx="11"/>
+          </p:nvPr>
+        </p:nvSpPr>
+        <p:spPr/>
+        <p:txBody>
+          <a:bodyPr/>
+          <a:lstStyle/>
+          <a:p>
+            <a:r>
+              <a:rPr lang="fr-CH"/>
+              <a:t>Présentation BA - Chatbot Réservation - Rodrigues dos Santos Fabio</a:t>
+            </a:r>
+            <a:endParaRPr lang="en-US" dirty="0"/>
+          </a:p>
+        </p:txBody>
+      </p:sp>
+      <p:sp>
+        <p:nvSpPr>
+          <p:cNvPr id="5" name="Espace réservé du numéro de diapositive 4">
+            <a:extLst>
+              <a:ext uri="{FF2B5EF4-FFF2-40B4-BE49-F238E27FC236}">
+                <a16:creationId xmlns:a16="http://schemas.microsoft.com/office/drawing/2014/main" id="{8C402CA1-2104-9FE9-E0B5-D0086A3DC965}"/>
+              </a:ext>
+            </a:extLst>
+          </p:cNvPr>
+          <p:cNvSpPr>
+            <a:spLocks noGrp="1"/>
+          </p:cNvSpPr>
+          <p:nvPr>
+            <p:ph type="sldNum" sz="quarter" idx="12"/>
+          </p:nvPr>
+        </p:nvSpPr>
+        <p:spPr/>
+        <p:txBody>
+          <a:bodyPr/>
+          <a:lstStyle/>
+          <a:p>
+            <a:fld id="{4FAB73BC-B049-4115-A692-8D63A059BFB8}" type="slidenum">
+              <a:rPr lang="en-US" smtClean="0"/>
+              <a:pPr/>
+              <a:t>13</a:t>
+            </a:fld>
+            <a:endParaRPr lang="en-US" dirty="0"/>
+          </a:p>
+        </p:txBody>
+      </p:sp>
+      <p:pic>
+        <p:nvPicPr>
+          <p:cNvPr id="7" name="Image 6" descr="Une image contenant texte, capture d’écran, Police, logo&#10;&#10;Description générée automatiquement">
+            <a:extLst>
+              <a:ext uri="{FF2B5EF4-FFF2-40B4-BE49-F238E27FC236}">
+                <a16:creationId xmlns:a16="http://schemas.microsoft.com/office/drawing/2014/main" id="{1324135E-10B6-B6F1-4C1E-18F0A9C53EEB}"/>
+              </a:ext>
+            </a:extLst>
+          </p:cNvPr>
+          <p:cNvPicPr>
+            <a:picLocks noChangeAspect="1"/>
+          </p:cNvPicPr>
+          <p:nvPr/>
+        </p:nvPicPr>
+        <p:blipFill>
+          <a:blip r:embed="rId2"/>
+          <a:stretch>
+            <a:fillRect/>
+          </a:stretch>
+        </p:blipFill>
+        <p:spPr>
+          <a:xfrm>
+            <a:off x="3993031" y="3424428"/>
+            <a:ext cx="7100394" cy="2379387"/>
+          </a:xfrm>
+          <a:prstGeom prst="rect">
+            <a:avLst/>
+          </a:prstGeom>
+        </p:spPr>
+      </p:pic>
+      <p:sp>
+        <p:nvSpPr>
+          <p:cNvPr id="8" name="ZoneTexte 7">
+            <a:extLst>
+              <a:ext uri="{FF2B5EF4-FFF2-40B4-BE49-F238E27FC236}">
+                <a16:creationId xmlns:a16="http://schemas.microsoft.com/office/drawing/2014/main" id="{CE5155F2-AFAF-E238-AF34-CC2A8B2F3A27}"/>
+              </a:ext>
+            </a:extLst>
+          </p:cNvPr>
+          <p:cNvSpPr txBox="1"/>
+          <p:nvPr/>
+        </p:nvSpPr>
+        <p:spPr>
+          <a:xfrm>
+            <a:off x="6771186" y="5898344"/>
+            <a:ext cx="1544084" cy="307777"/>
+          </a:xfrm>
+          <a:prstGeom prst="rect">
+            <a:avLst/>
+          </a:prstGeom>
+          <a:noFill/>
+        </p:spPr>
+        <p:txBody>
+          <a:bodyPr wrap="square" rtlCol="0">
+            <a:spAutoFit/>
+          </a:bodyPr>
+          <a:lstStyle/>
+          <a:p>
+            <a:r>
+              <a:rPr lang="fr-CH" sz="1400" dirty="0">
+                <a:solidFill>
+                  <a:schemeClr val="accent4"/>
+                </a:solidFill>
+              </a:rPr>
+              <a:t>Source: Rasa.com</a:t>
+            </a:r>
+            <a:endParaRPr lang="fr-CH" sz="1400" i="1" dirty="0">
+              <a:solidFill>
+                <a:schemeClr val="accent4"/>
+              </a:solidFill>
+            </a:endParaRPr>
+          </a:p>
+        </p:txBody>
+      </p:sp>
+    </p:spTree>
+    <p:extLst>
+      <p:ext uri="{BB962C8B-B14F-4D97-AF65-F5344CB8AC3E}">
+        <p14:creationId xmlns:p14="http://schemas.microsoft.com/office/powerpoint/2010/main" val="1092076491"/>
+      </p:ext>
+    </p:extLst>
+  </p:cSld>
+  <p:clrMapOvr>
+    <a:masterClrMapping/>
+  </p:clrMapOvr>
+</p:sld>
+</file>
+
+<file path=ppt/slides/slide14.xml><?xml version="1.0" encoding="utf-8"?>
+<p:sld xmlns:a="http://schemas.openxmlformats.org/drawingml/2006/main" xmlns:r="http://schemas.openxmlformats.org/officeDocument/2006/relationships" xmlns:p="http://schemas.openxmlformats.org/presentationml/2006/main">
+  <p:cSld>
+    <p:spTree>
+      <p:nvGrpSpPr>
+        <p:cNvPr id="1" name=""/>
+        <p:cNvGrpSpPr/>
+        <p:nvPr/>
+      </p:nvGrpSpPr>
+      <p:grpSpPr>
+        <a:xfrm>
+          <a:off x="0" y="0"/>
+          <a:ext cx="0" cy="0"/>
+          <a:chOff x="0" y="0"/>
+          <a:chExt cx="0" cy="0"/>
+        </a:xfrm>
+      </p:grpSpPr>
+      <p:sp>
+        <p:nvSpPr>
+          <p:cNvPr id="2" name="Titre 1">
+            <a:extLst>
+              <a:ext uri="{FF2B5EF4-FFF2-40B4-BE49-F238E27FC236}">
+                <a16:creationId xmlns:a16="http://schemas.microsoft.com/office/drawing/2014/main" id="{64CB46EB-D775-0ADD-C2CB-933B0912081C}"/>
+              </a:ext>
+            </a:extLst>
+          </p:cNvPr>
+          <p:cNvSpPr>
+            <a:spLocks noGrp="1"/>
+          </p:cNvSpPr>
+          <p:nvPr>
+            <p:ph type="title"/>
+          </p:nvPr>
+        </p:nvSpPr>
+        <p:spPr>
+          <a:xfrm>
+            <a:off x="60384" y="1123837"/>
+            <a:ext cx="3519577" cy="4601183"/>
+          </a:xfrm>
+        </p:spPr>
+        <p:txBody>
+          <a:bodyPr/>
+          <a:lstStyle/>
+          <a:p>
+            <a:r>
+              <a:rPr lang="fr-CH" dirty="0"/>
+              <a:t>Fondements théoriques – Rasa</a:t>
+            </a:r>
+          </a:p>
+        </p:txBody>
+      </p:sp>
+      <p:sp>
+        <p:nvSpPr>
+          <p:cNvPr id="3" name="Espace réservé du contenu 2">
+            <a:extLst>
+              <a:ext uri="{FF2B5EF4-FFF2-40B4-BE49-F238E27FC236}">
+                <a16:creationId xmlns:a16="http://schemas.microsoft.com/office/drawing/2014/main" id="{1720EA06-7A2D-8774-FBC9-EC668D4A35A6}"/>
+              </a:ext>
+            </a:extLst>
+          </p:cNvPr>
+          <p:cNvSpPr>
+            <a:spLocks noGrp="1"/>
+          </p:cNvSpPr>
+          <p:nvPr>
+            <p:ph idx="1"/>
+          </p:nvPr>
+        </p:nvSpPr>
+        <p:spPr>
+          <a:xfrm>
+            <a:off x="3579961" y="1202753"/>
+            <a:ext cx="3519577" cy="4083584"/>
+          </a:xfrm>
+        </p:spPr>
+        <p:txBody>
+          <a:bodyPr>
+            <a:normAutofit fontScale="92500" lnSpcReduction="10000"/>
+          </a:bodyPr>
+          <a:lstStyle/>
+          <a:p>
+            <a:pPr marL="0" indent="0">
+              <a:buNone/>
+            </a:pPr>
+            <a:r>
+              <a:rPr lang="fr-CH" sz="3400" b="1" dirty="0">
+                <a:latin typeface="+mj-lt"/>
+              </a:rPr>
+              <a:t>Structure</a:t>
+            </a:r>
+            <a:endParaRPr lang="fr-CH" sz="2800" b="1" dirty="0">
+              <a:latin typeface="+mj-lt"/>
+            </a:endParaRPr>
+          </a:p>
+          <a:p>
+            <a:pPr marL="0" indent="0">
+              <a:buNone/>
+            </a:pPr>
+            <a:r>
+              <a:rPr lang="fr-CH" sz="2400" dirty="0">
+                <a:latin typeface="+mj-lt"/>
+              </a:rPr>
+              <a:t>4 composants principaux</a:t>
+            </a:r>
+            <a:endParaRPr lang="fr-CH" sz="2600" dirty="0">
+              <a:latin typeface="+mj-lt"/>
+            </a:endParaRPr>
+          </a:p>
+          <a:p>
+            <a:pPr>
+              <a:buFont typeface="Arial" panose="020B0604020202020204" pitchFamily="34" charset="0"/>
+              <a:buChar char="•"/>
+            </a:pPr>
+            <a:r>
+              <a:rPr lang="fr-CH" b="1" dirty="0"/>
+              <a:t>Rasa </a:t>
+            </a:r>
+            <a:r>
+              <a:rPr lang="fr-CH" b="1" dirty="0" err="1"/>
+              <a:t>Core</a:t>
+            </a:r>
+            <a:r>
+              <a:rPr lang="fr-CH" b="1" dirty="0"/>
+              <a:t> </a:t>
+            </a:r>
+            <a:r>
+              <a:rPr lang="fr-CH" kern="1200" dirty="0">
+                <a:solidFill>
+                  <a:srgbClr val="595959"/>
+                </a:solidFill>
+                <a:effectLst/>
+                <a:ea typeface="+mn-ea"/>
+                <a:cs typeface="+mn-cs"/>
+              </a:rPr>
+              <a:t>– Logique conversationnelle</a:t>
+            </a:r>
+          </a:p>
+          <a:p>
+            <a:pPr>
+              <a:buFont typeface="Arial" panose="020B0604020202020204" pitchFamily="34" charset="0"/>
+              <a:buChar char="•"/>
+            </a:pPr>
+            <a:r>
+              <a:rPr lang="fr-CH" b="1" dirty="0"/>
+              <a:t>Rasa NLU </a:t>
+            </a:r>
+            <a:r>
+              <a:rPr lang="fr-CH" dirty="0"/>
+              <a:t>– Logique d’extraction d’entités et d’</a:t>
+            </a:r>
+            <a:r>
+              <a:rPr lang="fr-CH" dirty="0" err="1"/>
+              <a:t>intents</a:t>
+            </a:r>
+            <a:endParaRPr lang="fr-CH" dirty="0"/>
+          </a:p>
+          <a:p>
+            <a:pPr>
+              <a:buFont typeface="Arial" panose="020B0604020202020204" pitchFamily="34" charset="0"/>
+              <a:buChar char="•"/>
+            </a:pPr>
+            <a:r>
+              <a:rPr lang="fr-CH" b="1" dirty="0"/>
+              <a:t>Rasa Action Server </a:t>
+            </a:r>
+            <a:r>
+              <a:rPr lang="fr-CH" kern="1200" dirty="0">
+                <a:solidFill>
+                  <a:srgbClr val="595959"/>
+                </a:solidFill>
+                <a:effectLst/>
+                <a:ea typeface="+mn-ea"/>
+                <a:cs typeface="+mn-cs"/>
+              </a:rPr>
+              <a:t>– Code Python interagissant avec les composants externes à Rasa</a:t>
+            </a:r>
+          </a:p>
+          <a:p>
+            <a:pPr>
+              <a:buFont typeface="Arial" panose="020B0604020202020204" pitchFamily="34" charset="0"/>
+              <a:buChar char="•"/>
+            </a:pPr>
+            <a:r>
+              <a:rPr lang="fr-CH" b="1" dirty="0">
+                <a:solidFill>
+                  <a:srgbClr val="595959"/>
+                </a:solidFill>
+              </a:rPr>
+              <a:t>Rasa Agent </a:t>
+            </a:r>
+            <a:r>
+              <a:rPr lang="fr-CH" dirty="0">
+                <a:solidFill>
+                  <a:srgbClr val="595959"/>
+                </a:solidFill>
+              </a:rPr>
+              <a:t>– Interface logicielle dans le but d’interagir avec ces composants</a:t>
+            </a:r>
+          </a:p>
+        </p:txBody>
+      </p:sp>
+      <p:sp>
+        <p:nvSpPr>
+          <p:cNvPr id="4" name="Espace réservé du pied de page 3">
+            <a:extLst>
+              <a:ext uri="{FF2B5EF4-FFF2-40B4-BE49-F238E27FC236}">
+                <a16:creationId xmlns:a16="http://schemas.microsoft.com/office/drawing/2014/main" id="{AE8E29F7-A8D9-B247-62A1-EE62F1806F60}"/>
+              </a:ext>
+            </a:extLst>
+          </p:cNvPr>
+          <p:cNvSpPr>
+            <a:spLocks noGrp="1"/>
+          </p:cNvSpPr>
+          <p:nvPr>
+            <p:ph type="ftr" sz="quarter" idx="11"/>
+          </p:nvPr>
+        </p:nvSpPr>
+        <p:spPr/>
+        <p:txBody>
+          <a:bodyPr/>
+          <a:lstStyle/>
+          <a:p>
+            <a:r>
+              <a:rPr lang="fr-CH"/>
+              <a:t>Présentation BA - Chatbot Réservation - Rodrigues dos Santos Fabio</a:t>
+            </a:r>
+            <a:endParaRPr lang="en-US" dirty="0"/>
+          </a:p>
+        </p:txBody>
+      </p:sp>
+      <p:sp>
+        <p:nvSpPr>
+          <p:cNvPr id="5" name="Espace réservé du numéro de diapositive 4">
+            <a:extLst>
+              <a:ext uri="{FF2B5EF4-FFF2-40B4-BE49-F238E27FC236}">
+                <a16:creationId xmlns:a16="http://schemas.microsoft.com/office/drawing/2014/main" id="{8C402CA1-2104-9FE9-E0B5-D0086A3DC965}"/>
+              </a:ext>
+            </a:extLst>
+          </p:cNvPr>
+          <p:cNvSpPr>
+            <a:spLocks noGrp="1"/>
+          </p:cNvSpPr>
+          <p:nvPr>
+            <p:ph type="sldNum" sz="quarter" idx="12"/>
+          </p:nvPr>
+        </p:nvSpPr>
+        <p:spPr/>
+        <p:txBody>
+          <a:bodyPr/>
+          <a:lstStyle/>
+          <a:p>
+            <a:fld id="{4FAB73BC-B049-4115-A692-8D63A059BFB8}" type="slidenum">
+              <a:rPr lang="en-US" smtClean="0"/>
+              <a:pPr/>
+              <a:t>14</a:t>
+            </a:fld>
+            <a:endParaRPr lang="en-US" dirty="0"/>
+          </a:p>
+        </p:txBody>
+      </p:sp>
+      <p:sp>
+        <p:nvSpPr>
+          <p:cNvPr id="8" name="ZoneTexte 7">
+            <a:extLst>
+              <a:ext uri="{FF2B5EF4-FFF2-40B4-BE49-F238E27FC236}">
+                <a16:creationId xmlns:a16="http://schemas.microsoft.com/office/drawing/2014/main" id="{7F0A190D-8D24-C1A1-BB8F-89DEFB87EE4C}"/>
+              </a:ext>
+            </a:extLst>
+          </p:cNvPr>
+          <p:cNvSpPr txBox="1"/>
+          <p:nvPr/>
+        </p:nvSpPr>
+        <p:spPr>
+          <a:xfrm>
+            <a:off x="8637008" y="4763606"/>
+            <a:ext cx="1997127" cy="307777"/>
+          </a:xfrm>
+          <a:prstGeom prst="rect">
+            <a:avLst/>
+          </a:prstGeom>
+          <a:noFill/>
+        </p:spPr>
+        <p:txBody>
+          <a:bodyPr wrap="square" rtlCol="0">
+            <a:spAutoFit/>
+          </a:bodyPr>
+          <a:lstStyle/>
+          <a:p>
+            <a:r>
+              <a:rPr lang="fr-CH" sz="1400" dirty="0">
+                <a:solidFill>
+                  <a:schemeClr val="accent4"/>
+                </a:solidFill>
+              </a:rPr>
+              <a:t>Source: Rasa.com</a:t>
+            </a:r>
+            <a:endParaRPr lang="fr-CH" sz="1400" i="1" dirty="0">
+              <a:solidFill>
+                <a:schemeClr val="accent4"/>
+              </a:solidFill>
+            </a:endParaRPr>
+          </a:p>
+        </p:txBody>
+      </p:sp>
+      <p:pic>
+        <p:nvPicPr>
+          <p:cNvPr id="6" name="Image 5" descr="Une image contenant texte, diagramme, capture d’écran, Plan&#10;&#10;Description générée automatiquement">
+            <a:extLst>
+              <a:ext uri="{FF2B5EF4-FFF2-40B4-BE49-F238E27FC236}">
+                <a16:creationId xmlns:a16="http://schemas.microsoft.com/office/drawing/2014/main" id="{C491D1B6-7857-79C3-3696-5A1EE69D40E3}"/>
+              </a:ext>
+            </a:extLst>
+          </p:cNvPr>
+          <p:cNvPicPr>
+            <a:picLocks noChangeAspect="1"/>
+          </p:cNvPicPr>
+          <p:nvPr/>
+        </p:nvPicPr>
+        <p:blipFill rotWithShape="1">
+          <a:blip r:embed="rId2"/>
+          <a:srcRect l="9231" t="631" r="3823" b="548"/>
+          <a:stretch/>
+        </p:blipFill>
+        <p:spPr>
+          <a:xfrm>
+            <a:off x="6737229" y="1202753"/>
+            <a:ext cx="4912100" cy="3560853"/>
+          </a:xfrm>
+          <a:prstGeom prst="rect">
+            <a:avLst/>
+          </a:prstGeom>
+        </p:spPr>
+      </p:pic>
+    </p:spTree>
+    <p:extLst>
+      <p:ext uri="{BB962C8B-B14F-4D97-AF65-F5344CB8AC3E}">
+        <p14:creationId xmlns:p14="http://schemas.microsoft.com/office/powerpoint/2010/main" val="4094601274"/>
+      </p:ext>
+    </p:extLst>
+  </p:cSld>
+  <p:clrMapOvr>
+    <a:masterClrMapping/>
+  </p:clrMapOvr>
+</p:sld>
+</file>
+
+<file path=ppt/slides/slide15.xml><?xml version="1.0" encoding="utf-8"?>
+<p:sld xmlns:a="http://schemas.openxmlformats.org/drawingml/2006/main" xmlns:r="http://schemas.openxmlformats.org/officeDocument/2006/relationships" xmlns:p="http://schemas.openxmlformats.org/presentationml/2006/main">
+  <p:cSld>
+    <p:spTree>
+      <p:nvGrpSpPr>
+        <p:cNvPr id="1" name=""/>
+        <p:cNvGrpSpPr/>
+        <p:nvPr/>
+      </p:nvGrpSpPr>
+      <p:grpSpPr>
+        <a:xfrm>
+          <a:off x="0" y="0"/>
+          <a:ext cx="0" cy="0"/>
+          <a:chOff x="0" y="0"/>
+          <a:chExt cx="0" cy="0"/>
+        </a:xfrm>
+      </p:grpSpPr>
+      <p:sp>
+        <p:nvSpPr>
+          <p:cNvPr id="2" name="Titre 1">
+            <a:extLst>
+              <a:ext uri="{FF2B5EF4-FFF2-40B4-BE49-F238E27FC236}">
+                <a16:creationId xmlns:a16="http://schemas.microsoft.com/office/drawing/2014/main" id="{64CB46EB-D775-0ADD-C2CB-933B0912081C}"/>
+              </a:ext>
+            </a:extLst>
+          </p:cNvPr>
+          <p:cNvSpPr>
+            <a:spLocks noGrp="1"/>
+          </p:cNvSpPr>
+          <p:nvPr>
+            <p:ph type="title"/>
+          </p:nvPr>
+        </p:nvSpPr>
+        <p:spPr>
+          <a:xfrm>
+            <a:off x="60384" y="1123837"/>
+            <a:ext cx="3519578" cy="4601183"/>
+          </a:xfrm>
+        </p:spPr>
+        <p:txBody>
+          <a:bodyPr/>
+          <a:lstStyle/>
+          <a:p>
+            <a:r>
+              <a:rPr lang="fr-CH" dirty="0"/>
+              <a:t>Fondements théoriques – Rasa</a:t>
+            </a:r>
+          </a:p>
+        </p:txBody>
+      </p:sp>
+      <p:sp>
+        <p:nvSpPr>
+          <p:cNvPr id="4" name="Espace réservé du pied de page 3">
+            <a:extLst>
+              <a:ext uri="{FF2B5EF4-FFF2-40B4-BE49-F238E27FC236}">
+                <a16:creationId xmlns:a16="http://schemas.microsoft.com/office/drawing/2014/main" id="{AE8E29F7-A8D9-B247-62A1-EE62F1806F60}"/>
+              </a:ext>
+            </a:extLst>
+          </p:cNvPr>
+          <p:cNvSpPr>
+            <a:spLocks noGrp="1"/>
+          </p:cNvSpPr>
+          <p:nvPr>
+            <p:ph type="ftr" sz="quarter" idx="11"/>
+          </p:nvPr>
+        </p:nvSpPr>
+        <p:spPr/>
+        <p:txBody>
+          <a:bodyPr/>
+          <a:lstStyle/>
+          <a:p>
+            <a:r>
+              <a:rPr lang="fr-CH"/>
+              <a:t>Présentation BA - Chatbot Réservation - Rodrigues dos Santos Fabio</a:t>
+            </a:r>
+            <a:endParaRPr lang="en-US" dirty="0"/>
+          </a:p>
+        </p:txBody>
+      </p:sp>
+      <p:sp>
+        <p:nvSpPr>
+          <p:cNvPr id="5" name="Espace réservé du numéro de diapositive 4">
+            <a:extLst>
+              <a:ext uri="{FF2B5EF4-FFF2-40B4-BE49-F238E27FC236}">
+                <a16:creationId xmlns:a16="http://schemas.microsoft.com/office/drawing/2014/main" id="{8C402CA1-2104-9FE9-E0B5-D0086A3DC965}"/>
+              </a:ext>
+            </a:extLst>
+          </p:cNvPr>
+          <p:cNvSpPr>
+            <a:spLocks noGrp="1"/>
+          </p:cNvSpPr>
+          <p:nvPr>
+            <p:ph type="sldNum" sz="quarter" idx="12"/>
+          </p:nvPr>
+        </p:nvSpPr>
+        <p:spPr/>
+        <p:txBody>
+          <a:bodyPr/>
+          <a:lstStyle/>
+          <a:p>
+            <a:fld id="{4FAB73BC-B049-4115-A692-8D63A059BFB8}" type="slidenum">
+              <a:rPr lang="en-US" smtClean="0"/>
+              <a:pPr/>
+              <a:t>15</a:t>
+            </a:fld>
+            <a:endParaRPr lang="en-US" dirty="0"/>
+          </a:p>
+        </p:txBody>
+      </p:sp>
+      <p:sp>
+        <p:nvSpPr>
+          <p:cNvPr id="12" name="Espace réservé du contenu 11">
+            <a:extLst>
+              <a:ext uri="{FF2B5EF4-FFF2-40B4-BE49-F238E27FC236}">
+                <a16:creationId xmlns:a16="http://schemas.microsoft.com/office/drawing/2014/main" id="{8F1EC90A-EEB7-D5F1-EB19-04D070274275}"/>
+              </a:ext>
+            </a:extLst>
+          </p:cNvPr>
+          <p:cNvSpPr>
+            <a:spLocks noGrp="1"/>
+          </p:cNvSpPr>
+          <p:nvPr>
+            <p:ph idx="1"/>
+          </p:nvPr>
+        </p:nvSpPr>
+        <p:spPr/>
+        <p:txBody>
+          <a:bodyPr>
+            <a:normAutofit/>
+          </a:bodyPr>
+          <a:lstStyle/>
+          <a:p>
+            <a:pPr marL="0" indent="0">
+              <a:buNone/>
+            </a:pPr>
+            <a:r>
+              <a:rPr lang="fr-CH" sz="3400" b="1" dirty="0">
+                <a:latin typeface="+mj-lt"/>
+              </a:rPr>
+              <a:t>Fonctionnement</a:t>
+            </a:r>
+            <a:endParaRPr lang="fr-CH" sz="3200" dirty="0">
+              <a:latin typeface="+mj-lt"/>
+            </a:endParaRPr>
+          </a:p>
+          <a:p>
+            <a:pPr marL="0" indent="0">
+              <a:buNone/>
+            </a:pPr>
+            <a:r>
+              <a:rPr lang="fr-CH" sz="2400" dirty="0">
+                <a:latin typeface="+mj-lt"/>
+              </a:rPr>
+              <a:t>Les éléments suivants sont centraux à la réalisation d’un bot Rasa</a:t>
+            </a:r>
+          </a:p>
+          <a:p>
+            <a:pPr>
+              <a:buFont typeface="Arial" panose="020B0604020202020204" pitchFamily="34" charset="0"/>
+              <a:buChar char="•"/>
+            </a:pPr>
+            <a:r>
+              <a:rPr lang="fr-CH" dirty="0">
+                <a:latin typeface="+mj-lt"/>
+              </a:rPr>
+              <a:t>Stories – Suites d’actions représentant un chemin de conversation</a:t>
+            </a:r>
+          </a:p>
+          <a:p>
+            <a:pPr>
+              <a:buFont typeface="Arial" panose="020B0604020202020204" pitchFamily="34" charset="0"/>
+              <a:buChar char="•"/>
+            </a:pPr>
+            <a:r>
+              <a:rPr lang="fr-CH" dirty="0">
+                <a:latin typeface="+mj-lt"/>
+              </a:rPr>
+              <a:t>Slots – Variables conversationnelles</a:t>
+            </a:r>
+          </a:p>
+          <a:p>
+            <a:pPr>
+              <a:buFont typeface="Arial" panose="020B0604020202020204" pitchFamily="34" charset="0"/>
+              <a:buChar char="•"/>
+            </a:pPr>
+            <a:r>
+              <a:rPr lang="fr-CH" dirty="0">
+                <a:latin typeface="+mj-lt"/>
+              </a:rPr>
+              <a:t>Actions – Suites d’instructions pouvant interagir avec des composants externes ou internes</a:t>
+            </a:r>
+          </a:p>
+          <a:p>
+            <a:pPr>
+              <a:buFont typeface="Arial" panose="020B0604020202020204" pitchFamily="34" charset="0"/>
+              <a:buChar char="•"/>
+            </a:pPr>
+            <a:r>
+              <a:rPr lang="fr-CH" dirty="0">
+                <a:latin typeface="+mj-lt"/>
+              </a:rPr>
+              <a:t>Entités – Informations récupérées selon paternes spécifiés</a:t>
+            </a:r>
+          </a:p>
+          <a:p>
+            <a:pPr>
+              <a:buFont typeface="Arial" panose="020B0604020202020204" pitchFamily="34" charset="0"/>
+              <a:buChar char="•"/>
+            </a:pPr>
+            <a:r>
+              <a:rPr lang="fr-CH" dirty="0" err="1">
+                <a:latin typeface="+mj-lt"/>
+              </a:rPr>
+              <a:t>Intents</a:t>
+            </a:r>
+            <a:r>
+              <a:rPr lang="fr-CH" dirty="0">
+                <a:latin typeface="+mj-lt"/>
+              </a:rPr>
+              <a:t> – Catégorisation des possibles entrées utilisateur</a:t>
+            </a:r>
+          </a:p>
+          <a:p>
+            <a:pPr marL="0" indent="0">
+              <a:buNone/>
+            </a:pPr>
+            <a:endParaRPr lang="fr-CH" dirty="0">
+              <a:latin typeface="+mj-lt"/>
+            </a:endParaRPr>
+          </a:p>
+        </p:txBody>
+      </p:sp>
+    </p:spTree>
+    <p:extLst>
+      <p:ext uri="{BB962C8B-B14F-4D97-AF65-F5344CB8AC3E}">
+        <p14:creationId xmlns:p14="http://schemas.microsoft.com/office/powerpoint/2010/main" val="931857188"/>
+      </p:ext>
+    </p:extLst>
+  </p:cSld>
+  <p:clrMapOvr>
+    <a:masterClrMapping/>
+  </p:clrMapOvr>
+</p:sld>
+</file>
+
+<file path=ppt/slides/slide16.xml><?xml version="1.0" encoding="utf-8"?>
+<p:sld xmlns:a="http://schemas.openxmlformats.org/drawingml/2006/main" xmlns:r="http://schemas.openxmlformats.org/officeDocument/2006/relationships" xmlns:p="http://schemas.openxmlformats.org/presentationml/2006/main">
+  <p:cSld>
+    <p:spTree>
+      <p:nvGrpSpPr>
+        <p:cNvPr id="1" name=""/>
+        <p:cNvGrpSpPr/>
+        <p:nvPr/>
+      </p:nvGrpSpPr>
+      <p:grpSpPr>
+        <a:xfrm>
+          <a:off x="0" y="0"/>
+          <a:ext cx="0" cy="0"/>
+          <a:chOff x="0" y="0"/>
+          <a:chExt cx="0" cy="0"/>
+        </a:xfrm>
+      </p:grpSpPr>
+      <p:sp>
+        <p:nvSpPr>
+          <p:cNvPr id="2" name="Titre 1">
+            <a:extLst>
+              <a:ext uri="{FF2B5EF4-FFF2-40B4-BE49-F238E27FC236}">
+                <a16:creationId xmlns:a16="http://schemas.microsoft.com/office/drawing/2014/main" id="{64CB46EB-D775-0ADD-C2CB-933B0912081C}"/>
+              </a:ext>
+            </a:extLst>
+          </p:cNvPr>
+          <p:cNvSpPr>
+            <a:spLocks noGrp="1"/>
+          </p:cNvSpPr>
+          <p:nvPr>
+            <p:ph type="title"/>
+          </p:nvPr>
+        </p:nvSpPr>
+        <p:spPr>
+          <a:xfrm>
+            <a:off x="60384" y="1123837"/>
+            <a:ext cx="3519578" cy="4601183"/>
+          </a:xfrm>
+        </p:spPr>
+        <p:txBody>
+          <a:bodyPr/>
+          <a:lstStyle/>
+          <a:p>
+            <a:r>
+              <a:rPr lang="fr-CH" dirty="0"/>
+              <a:t>Fondements théoriques – Rasa</a:t>
+            </a:r>
+          </a:p>
+        </p:txBody>
+      </p:sp>
+      <p:sp>
+        <p:nvSpPr>
+          <p:cNvPr id="4" name="Espace réservé du pied de page 3">
+            <a:extLst>
+              <a:ext uri="{FF2B5EF4-FFF2-40B4-BE49-F238E27FC236}">
+                <a16:creationId xmlns:a16="http://schemas.microsoft.com/office/drawing/2014/main" id="{AE8E29F7-A8D9-B247-62A1-EE62F1806F60}"/>
+              </a:ext>
+            </a:extLst>
+          </p:cNvPr>
+          <p:cNvSpPr>
+            <a:spLocks noGrp="1"/>
+          </p:cNvSpPr>
+          <p:nvPr>
+            <p:ph type="ftr" sz="quarter" idx="11"/>
+          </p:nvPr>
+        </p:nvSpPr>
+        <p:spPr/>
+        <p:txBody>
+          <a:bodyPr/>
+          <a:lstStyle/>
+          <a:p>
+            <a:r>
+              <a:rPr lang="fr-CH"/>
+              <a:t>Présentation BA - Chatbot Réservation - Rodrigues dos Santos Fabio</a:t>
+            </a:r>
+            <a:endParaRPr lang="en-US" dirty="0"/>
+          </a:p>
+        </p:txBody>
+      </p:sp>
+      <p:sp>
+        <p:nvSpPr>
+          <p:cNvPr id="5" name="Espace réservé du numéro de diapositive 4">
+            <a:extLst>
+              <a:ext uri="{FF2B5EF4-FFF2-40B4-BE49-F238E27FC236}">
+                <a16:creationId xmlns:a16="http://schemas.microsoft.com/office/drawing/2014/main" id="{8C402CA1-2104-9FE9-E0B5-D0086A3DC965}"/>
+              </a:ext>
+            </a:extLst>
+          </p:cNvPr>
+          <p:cNvSpPr>
+            <a:spLocks noGrp="1"/>
+          </p:cNvSpPr>
+          <p:nvPr>
+            <p:ph type="sldNum" sz="quarter" idx="12"/>
+          </p:nvPr>
+        </p:nvSpPr>
+        <p:spPr/>
+        <p:txBody>
+          <a:bodyPr/>
+          <a:lstStyle/>
+          <a:p>
+            <a:fld id="{4FAB73BC-B049-4115-A692-8D63A059BFB8}" type="slidenum">
+              <a:rPr lang="en-US" smtClean="0"/>
+              <a:pPr/>
+              <a:t>16</a:t>
+            </a:fld>
+            <a:endParaRPr lang="en-US" dirty="0"/>
+          </a:p>
+        </p:txBody>
+      </p:sp>
+      <p:sp>
+        <p:nvSpPr>
+          <p:cNvPr id="12" name="Espace réservé du contenu 11">
+            <a:extLst>
+              <a:ext uri="{FF2B5EF4-FFF2-40B4-BE49-F238E27FC236}">
+                <a16:creationId xmlns:a16="http://schemas.microsoft.com/office/drawing/2014/main" id="{8F1EC90A-EEB7-D5F1-EB19-04D070274275}"/>
+              </a:ext>
+            </a:extLst>
+          </p:cNvPr>
+          <p:cNvSpPr>
+            <a:spLocks noGrp="1"/>
+          </p:cNvSpPr>
+          <p:nvPr>
+            <p:ph idx="1"/>
+          </p:nvPr>
+        </p:nvSpPr>
+        <p:spPr>
+          <a:xfrm>
+            <a:off x="3701373" y="813331"/>
+            <a:ext cx="7315200" cy="1094088"/>
+          </a:xfrm>
+        </p:spPr>
+        <p:txBody>
+          <a:bodyPr>
+            <a:normAutofit/>
+          </a:bodyPr>
+          <a:lstStyle/>
+          <a:p>
+            <a:pPr marL="0" indent="0">
+              <a:buNone/>
+            </a:pPr>
+            <a:r>
+              <a:rPr lang="fr-CH" sz="3400" b="1" dirty="0">
+                <a:latin typeface="+mj-lt"/>
+              </a:rPr>
+              <a:t>Exemple Fonctionnement</a:t>
+            </a:r>
+            <a:endParaRPr lang="fr-CH" sz="3200" dirty="0">
+              <a:latin typeface="+mj-lt"/>
+            </a:endParaRPr>
+          </a:p>
+        </p:txBody>
+      </p:sp>
+      <p:sp>
+        <p:nvSpPr>
+          <p:cNvPr id="6" name="ZoneTexte 5">
+            <a:extLst>
+              <a:ext uri="{FF2B5EF4-FFF2-40B4-BE49-F238E27FC236}">
+                <a16:creationId xmlns:a16="http://schemas.microsoft.com/office/drawing/2014/main" id="{66B919D7-9503-CDD3-479E-6254433937ED}"/>
+              </a:ext>
+            </a:extLst>
+          </p:cNvPr>
+          <p:cNvSpPr txBox="1"/>
+          <p:nvPr/>
+        </p:nvSpPr>
+        <p:spPr>
+          <a:xfrm>
+            <a:off x="3701373" y="1958195"/>
+            <a:ext cx="3825495" cy="3539430"/>
+          </a:xfrm>
+          <a:prstGeom prst="rect">
+            <a:avLst/>
+          </a:prstGeom>
+          <a:solidFill>
+            <a:schemeClr val="bg1">
+              <a:lumMod val="95000"/>
+            </a:schemeClr>
+          </a:solidFill>
+          <a:ln>
+            <a:solidFill>
+              <a:schemeClr val="tx1"/>
+            </a:solidFill>
+          </a:ln>
+        </p:spPr>
+        <p:txBody>
+          <a:bodyPr wrap="square" rtlCol="0">
+            <a:spAutoFit/>
+          </a:bodyPr>
+          <a:lstStyle/>
+          <a:p>
+            <a:r>
+              <a:rPr lang="en-US" sz="1600" dirty="0">
+                <a:latin typeface="Consolas" panose="020B0609020204030204" pitchFamily="49" charset="0"/>
+              </a:rPr>
+              <a:t>stories:</a:t>
+            </a:r>
+          </a:p>
+          <a:p>
+            <a:r>
+              <a:rPr lang="en-US" sz="1600" dirty="0">
+                <a:latin typeface="Consolas" panose="020B0609020204030204" pitchFamily="49" charset="0"/>
+              </a:rPr>
+              <a:t> - story: Ask user name</a:t>
+            </a:r>
+          </a:p>
+          <a:p>
+            <a:r>
+              <a:rPr lang="en-US" sz="1600" dirty="0">
+                <a:latin typeface="Consolas" panose="020B0609020204030204" pitchFamily="49" charset="0"/>
+              </a:rPr>
+              <a:t>   steps:</a:t>
+            </a:r>
+          </a:p>
+          <a:p>
+            <a:r>
+              <a:rPr lang="en-US" sz="1600" dirty="0">
+                <a:latin typeface="Consolas" panose="020B0609020204030204" pitchFamily="49" charset="0"/>
+              </a:rPr>
+              <a:t>   - intent: greet</a:t>
+            </a:r>
+          </a:p>
+          <a:p>
+            <a:r>
+              <a:rPr lang="en-US" sz="1600" dirty="0">
+                <a:latin typeface="Consolas" panose="020B0609020204030204" pitchFamily="49" charset="0"/>
+              </a:rPr>
+              <a:t>   - action: </a:t>
+            </a:r>
+            <a:r>
+              <a:rPr lang="en-US" sz="1600" dirty="0" err="1">
+                <a:latin typeface="Consolas" panose="020B0609020204030204" pitchFamily="49" charset="0"/>
+              </a:rPr>
+              <a:t>utter_greet</a:t>
+            </a:r>
+            <a:endParaRPr lang="en-US" sz="1600" dirty="0">
+              <a:latin typeface="Consolas" panose="020B0609020204030204" pitchFamily="49" charset="0"/>
+            </a:endParaRPr>
+          </a:p>
+          <a:p>
+            <a:r>
+              <a:rPr lang="en-US" sz="1600" dirty="0">
+                <a:latin typeface="Consolas" panose="020B0609020204030204" pitchFamily="49" charset="0"/>
+              </a:rPr>
+              <a:t>   - action: </a:t>
+            </a:r>
+            <a:r>
+              <a:rPr lang="en-US" sz="1600" dirty="0" err="1">
+                <a:latin typeface="Consolas" panose="020B0609020204030204" pitchFamily="49" charset="0"/>
+              </a:rPr>
+              <a:t>utter_ask_name</a:t>
+            </a:r>
+            <a:endParaRPr lang="en-US" sz="1600" dirty="0">
+              <a:latin typeface="Consolas" panose="020B0609020204030204" pitchFamily="49" charset="0"/>
+            </a:endParaRPr>
+          </a:p>
+          <a:p>
+            <a:r>
+              <a:rPr lang="en-US" sz="1600" dirty="0">
+                <a:latin typeface="Consolas" panose="020B0609020204030204" pitchFamily="49" charset="0"/>
+              </a:rPr>
+              <a:t>   - intent: </a:t>
+            </a:r>
+            <a:r>
+              <a:rPr lang="en-US" sz="1600" dirty="0" err="1">
+                <a:latin typeface="Consolas" panose="020B0609020204030204" pitchFamily="49" charset="0"/>
+              </a:rPr>
+              <a:t>say_name</a:t>
+            </a:r>
+            <a:endParaRPr lang="en-US" sz="1600" dirty="0">
+              <a:latin typeface="Consolas" panose="020B0609020204030204" pitchFamily="49" charset="0"/>
+            </a:endParaRPr>
+          </a:p>
+          <a:p>
+            <a:r>
+              <a:rPr lang="en-US" sz="1600" dirty="0">
+                <a:latin typeface="Consolas" panose="020B0609020204030204" pitchFamily="49" charset="0"/>
+              </a:rPr>
+              <a:t>   - action: </a:t>
+            </a:r>
+            <a:r>
+              <a:rPr lang="en-US" sz="1600" dirty="0" err="1">
+                <a:latin typeface="Consolas" panose="020B0609020204030204" pitchFamily="49" charset="0"/>
+              </a:rPr>
+              <a:t>name_saved</a:t>
+            </a:r>
+            <a:endParaRPr lang="en-US" sz="1600" dirty="0">
+              <a:latin typeface="Consolas" panose="020B0609020204030204" pitchFamily="49" charset="0"/>
+            </a:endParaRPr>
+          </a:p>
+          <a:p>
+            <a:r>
+              <a:rPr lang="en-US" sz="1600" dirty="0">
+                <a:latin typeface="Consolas" panose="020B0609020204030204" pitchFamily="49" charset="0"/>
+              </a:rPr>
+              <a:t>slots:</a:t>
+            </a:r>
+          </a:p>
+          <a:p>
+            <a:r>
+              <a:rPr lang="en-US" sz="1600" dirty="0">
+                <a:latin typeface="Consolas" panose="020B0609020204030204" pitchFamily="49" charset="0"/>
+              </a:rPr>
+              <a:t>	</a:t>
+            </a:r>
+            <a:r>
+              <a:rPr lang="en-US" sz="1600" dirty="0" err="1">
+                <a:latin typeface="Consolas" panose="020B0609020204030204" pitchFamily="49" charset="0"/>
+              </a:rPr>
+              <a:t>p</a:t>
+            </a:r>
+            <a:r>
+              <a:rPr lang="en-US" sz="1600" b="0" dirty="0" err="1">
+                <a:effectLst/>
+                <a:latin typeface="Consolas" panose="020B0609020204030204" pitchFamily="49" charset="0"/>
+              </a:rPr>
+              <a:t>renom_slot</a:t>
+            </a:r>
+            <a:r>
+              <a:rPr lang="en-US" sz="1600" b="0" dirty="0">
+                <a:effectLst/>
+                <a:latin typeface="Consolas" panose="020B0609020204030204" pitchFamily="49" charset="0"/>
+              </a:rPr>
+              <a:t>:</a:t>
+            </a:r>
+          </a:p>
+          <a:p>
+            <a:r>
+              <a:rPr lang="en-US" sz="1600" b="0" dirty="0">
+                <a:effectLst/>
+                <a:latin typeface="Consolas" panose="020B0609020204030204" pitchFamily="49" charset="0"/>
+              </a:rPr>
+              <a:t>	    	type: text</a:t>
+            </a:r>
+          </a:p>
+          <a:p>
+            <a:r>
+              <a:rPr lang="en-US" sz="1600" b="0" dirty="0">
+                <a:effectLst/>
+                <a:latin typeface="Consolas" panose="020B0609020204030204" pitchFamily="49" charset="0"/>
+              </a:rPr>
+              <a:t>    		mappings:</a:t>
+            </a:r>
+          </a:p>
+          <a:p>
+            <a:r>
+              <a:rPr lang="en-US" sz="1600" b="0" dirty="0">
+                <a:effectLst/>
+                <a:latin typeface="Consolas" panose="020B0609020204030204" pitchFamily="49" charset="0"/>
+              </a:rPr>
+              <a:t>    		  - type: </a:t>
+            </a:r>
+            <a:r>
+              <a:rPr lang="en-US" sz="1600" b="0" dirty="0" err="1">
+                <a:effectLst/>
+                <a:latin typeface="Consolas" panose="020B0609020204030204" pitchFamily="49" charset="0"/>
+              </a:rPr>
+              <a:t>from_entity</a:t>
+            </a:r>
+            <a:endParaRPr lang="en-US" sz="1600" b="0" dirty="0">
+              <a:effectLst/>
+              <a:latin typeface="Consolas" panose="020B0609020204030204" pitchFamily="49" charset="0"/>
+            </a:endParaRPr>
+          </a:p>
+          <a:p>
+            <a:r>
+              <a:rPr lang="en-US" sz="1600" b="0" dirty="0">
+                <a:effectLst/>
+                <a:latin typeface="Consolas" panose="020B0609020204030204" pitchFamily="49" charset="0"/>
+              </a:rPr>
+              <a:t>        		entity: </a:t>
+            </a:r>
+            <a:r>
+              <a:rPr lang="en-US" sz="1600" b="0" dirty="0" err="1">
+                <a:effectLst/>
+                <a:latin typeface="Consolas" panose="020B0609020204030204" pitchFamily="49" charset="0"/>
+              </a:rPr>
+              <a:t>prenom</a:t>
+            </a:r>
+            <a:endParaRPr lang="en-US" sz="1600" b="0" dirty="0">
+              <a:effectLst/>
+              <a:latin typeface="Consolas" panose="020B0609020204030204" pitchFamily="49" charset="0"/>
+            </a:endParaRPr>
+          </a:p>
+        </p:txBody>
+      </p:sp>
+      <p:sp>
+        <p:nvSpPr>
+          <p:cNvPr id="7" name="ZoneTexte 6">
+            <a:extLst>
+              <a:ext uri="{FF2B5EF4-FFF2-40B4-BE49-F238E27FC236}">
+                <a16:creationId xmlns:a16="http://schemas.microsoft.com/office/drawing/2014/main" id="{68209B98-828B-D6CA-CE54-B9224CC52DF8}"/>
+              </a:ext>
+            </a:extLst>
+          </p:cNvPr>
+          <p:cNvSpPr txBox="1"/>
+          <p:nvPr/>
+        </p:nvSpPr>
+        <p:spPr>
+          <a:xfrm>
+            <a:off x="7526868" y="1958194"/>
+            <a:ext cx="3954889" cy="3539430"/>
+          </a:xfrm>
+          <a:prstGeom prst="rect">
+            <a:avLst/>
+          </a:prstGeom>
+          <a:solidFill>
+            <a:schemeClr val="bg1">
+              <a:lumMod val="95000"/>
+            </a:schemeClr>
+          </a:solidFill>
+          <a:ln>
+            <a:solidFill>
+              <a:schemeClr val="tx1"/>
+            </a:solidFill>
+          </a:ln>
+        </p:spPr>
+        <p:txBody>
+          <a:bodyPr wrap="square" rtlCol="0">
+            <a:spAutoFit/>
+          </a:bodyPr>
+          <a:lstStyle/>
+          <a:p>
+            <a:r>
+              <a:rPr lang="fr-CH" sz="1600" dirty="0" err="1">
+                <a:latin typeface="Consolas" panose="020B0609020204030204" pitchFamily="49" charset="0"/>
+              </a:rPr>
+              <a:t>nlu</a:t>
+            </a:r>
+            <a:r>
+              <a:rPr lang="fr-CH" sz="1600" dirty="0">
+                <a:latin typeface="Consolas" panose="020B0609020204030204" pitchFamily="49" charset="0"/>
+              </a:rPr>
+              <a:t>:</a:t>
+            </a:r>
+          </a:p>
+          <a:p>
+            <a:r>
+              <a:rPr lang="fr-CH" sz="1600" dirty="0">
+                <a:latin typeface="Consolas" panose="020B0609020204030204" pitchFamily="49" charset="0"/>
+              </a:rPr>
+              <a:t> - </a:t>
+            </a:r>
+            <a:r>
+              <a:rPr lang="fr-CH" sz="1600" dirty="0" err="1">
+                <a:latin typeface="Consolas" panose="020B0609020204030204" pitchFamily="49" charset="0"/>
+              </a:rPr>
+              <a:t>intent</a:t>
+            </a:r>
+            <a:r>
+              <a:rPr lang="fr-CH" sz="1600" dirty="0">
+                <a:latin typeface="Consolas" panose="020B0609020204030204" pitchFamily="49" charset="0"/>
+              </a:rPr>
+              <a:t>: </a:t>
+            </a:r>
+            <a:r>
+              <a:rPr lang="fr-CH" sz="1600" dirty="0" err="1">
+                <a:latin typeface="Consolas" panose="020B0609020204030204" pitchFamily="49" charset="0"/>
+              </a:rPr>
+              <a:t>say_name</a:t>
+            </a:r>
+            <a:endParaRPr lang="fr-CH" sz="1600" dirty="0">
+              <a:latin typeface="Consolas" panose="020B0609020204030204" pitchFamily="49" charset="0"/>
+            </a:endParaRPr>
+          </a:p>
+          <a:p>
+            <a:r>
+              <a:rPr lang="fr-CH" sz="1600" dirty="0">
+                <a:latin typeface="Consolas" panose="020B0609020204030204" pitchFamily="49" charset="0"/>
+              </a:rPr>
+              <a:t>    </a:t>
+            </a:r>
+            <a:r>
+              <a:rPr lang="fr-CH" sz="1600" dirty="0" err="1">
+                <a:latin typeface="Consolas" panose="020B0609020204030204" pitchFamily="49" charset="0"/>
+              </a:rPr>
+              <a:t>examples</a:t>
+            </a:r>
+            <a:r>
+              <a:rPr lang="fr-CH" sz="1600" dirty="0">
+                <a:latin typeface="Consolas" panose="020B0609020204030204" pitchFamily="49" charset="0"/>
+              </a:rPr>
+              <a:t>: |</a:t>
+            </a:r>
+          </a:p>
+          <a:p>
+            <a:r>
+              <a:rPr lang="fr-CH" sz="1600" dirty="0">
+                <a:latin typeface="Consolas" panose="020B0609020204030204" pitchFamily="49" charset="0"/>
+              </a:rPr>
+              <a:t>	- Je m’appelle [Jean](</a:t>
+            </a:r>
+            <a:r>
+              <a:rPr lang="fr-CH" sz="1600" dirty="0" err="1">
+                <a:latin typeface="Consolas" panose="020B0609020204030204" pitchFamily="49" charset="0"/>
+              </a:rPr>
+              <a:t>prenom</a:t>
+            </a:r>
+            <a:r>
+              <a:rPr lang="fr-CH" sz="1600" dirty="0">
+                <a:latin typeface="Consolas" panose="020B0609020204030204" pitchFamily="49" charset="0"/>
+              </a:rPr>
+              <a:t>)</a:t>
+            </a:r>
+          </a:p>
+          <a:p>
+            <a:r>
+              <a:rPr lang="fr-CH" sz="1600" dirty="0">
+                <a:latin typeface="Consolas" panose="020B0609020204030204" pitchFamily="49" charset="0"/>
+              </a:rPr>
+              <a:t>	- Je suis [Pierre](</a:t>
+            </a:r>
+            <a:r>
+              <a:rPr lang="fr-CH" sz="1600" dirty="0" err="1">
+                <a:latin typeface="Consolas" panose="020B0609020204030204" pitchFamily="49" charset="0"/>
+              </a:rPr>
+              <a:t>prenom</a:t>
+            </a:r>
+            <a:r>
+              <a:rPr lang="fr-CH" sz="1600" dirty="0">
+                <a:latin typeface="Consolas" panose="020B0609020204030204" pitchFamily="49" charset="0"/>
+              </a:rPr>
+              <a:t>)</a:t>
+            </a:r>
+          </a:p>
+          <a:p>
+            <a:endParaRPr lang="fr-CH" sz="1600" dirty="0">
+              <a:latin typeface="Consolas" panose="020B0609020204030204" pitchFamily="49" charset="0"/>
+            </a:endParaRPr>
+          </a:p>
+          <a:p>
+            <a:endParaRPr lang="fr-CH" sz="1600" dirty="0">
+              <a:latin typeface="Consolas" panose="020B0609020204030204" pitchFamily="49" charset="0"/>
+            </a:endParaRPr>
+          </a:p>
+          <a:p>
+            <a:endParaRPr lang="fr-CH" sz="1600" dirty="0">
+              <a:latin typeface="Consolas" panose="020B0609020204030204" pitchFamily="49" charset="0"/>
+            </a:endParaRPr>
+          </a:p>
+          <a:p>
+            <a:r>
+              <a:rPr lang="fr-CH" sz="1600" b="0" dirty="0" err="1">
+                <a:effectLst/>
+                <a:latin typeface="Consolas" panose="020B0609020204030204" pitchFamily="49" charset="0"/>
+              </a:rPr>
+              <a:t>entities</a:t>
+            </a:r>
+            <a:r>
+              <a:rPr lang="fr-CH" sz="1600" b="0" dirty="0">
+                <a:effectLst/>
+                <a:latin typeface="Consolas" panose="020B0609020204030204" pitchFamily="49" charset="0"/>
+              </a:rPr>
+              <a:t>:</a:t>
+            </a:r>
+          </a:p>
+          <a:p>
+            <a:r>
+              <a:rPr lang="fr-CH" sz="1600" dirty="0">
+                <a:latin typeface="Consolas" panose="020B0609020204030204" pitchFamily="49" charset="0"/>
+              </a:rPr>
+              <a:t>- </a:t>
+            </a:r>
+            <a:r>
+              <a:rPr lang="fr-CH" sz="1600" dirty="0" err="1">
+                <a:latin typeface="Consolas" panose="020B0609020204030204" pitchFamily="49" charset="0"/>
+              </a:rPr>
+              <a:t>prenom</a:t>
+            </a:r>
+            <a:endParaRPr lang="fr-CH" sz="1600" dirty="0">
+              <a:latin typeface="Consolas" panose="020B0609020204030204" pitchFamily="49" charset="0"/>
+            </a:endParaRPr>
+          </a:p>
+          <a:p>
+            <a:endParaRPr lang="fr-CH" sz="1600" dirty="0">
+              <a:latin typeface="Consolas" panose="020B0609020204030204" pitchFamily="49" charset="0"/>
+            </a:endParaRPr>
+          </a:p>
+          <a:p>
+            <a:endParaRPr lang="fr-CH" sz="1600" dirty="0">
+              <a:latin typeface="Consolas" panose="020B0609020204030204" pitchFamily="49" charset="0"/>
+            </a:endParaRPr>
+          </a:p>
+          <a:p>
+            <a:endParaRPr lang="fr-CH" sz="1600" dirty="0">
+              <a:latin typeface="Consolas" panose="020B0609020204030204" pitchFamily="49" charset="0"/>
+            </a:endParaRPr>
+          </a:p>
+          <a:p>
+            <a:endParaRPr lang="fr-CH" sz="1600" dirty="0">
+              <a:latin typeface="Consolas" panose="020B0609020204030204" pitchFamily="49" charset="0"/>
+            </a:endParaRPr>
+          </a:p>
+        </p:txBody>
+      </p:sp>
+    </p:spTree>
+    <p:extLst>
+      <p:ext uri="{BB962C8B-B14F-4D97-AF65-F5344CB8AC3E}">
+        <p14:creationId xmlns:p14="http://schemas.microsoft.com/office/powerpoint/2010/main" val="687804841"/>
+      </p:ext>
+    </p:extLst>
+  </p:cSld>
+  <p:clrMapOvr>
+    <a:masterClrMapping/>
+  </p:clrMapOvr>
+</p:sld>
+</file>
+
+<file path=ppt/slides/slide17.xml><?xml version="1.0" encoding="utf-8"?>
+<p:sld xmlns:a="http://schemas.openxmlformats.org/drawingml/2006/main" xmlns:r="http://schemas.openxmlformats.org/officeDocument/2006/relationships" xmlns:p="http://schemas.openxmlformats.org/presentationml/2006/main">
+  <p:cSld>
+    <p:spTree>
+      <p:nvGrpSpPr>
+        <p:cNvPr id="1" name=""/>
+        <p:cNvGrpSpPr/>
+        <p:nvPr/>
+      </p:nvGrpSpPr>
+      <p:grpSpPr>
+        <a:xfrm>
+          <a:off x="0" y="0"/>
+          <a:ext cx="0" cy="0"/>
+          <a:chOff x="0" y="0"/>
+          <a:chExt cx="0" cy="0"/>
+        </a:xfrm>
+      </p:grpSpPr>
+      <p:sp>
+        <p:nvSpPr>
+          <p:cNvPr id="2" name="Titre 1">
+            <a:extLst>
+              <a:ext uri="{FF2B5EF4-FFF2-40B4-BE49-F238E27FC236}">
                 <a16:creationId xmlns:a16="http://schemas.microsoft.com/office/drawing/2014/main" id="{06DBEBEE-FE11-1D96-3A92-5F67EDCA7FC5}"/>
               </a:ext>
             </a:extLst>
@@ -5031,7 +6615,7 @@
             <a:fld id="{4FAB73BC-B049-4115-A692-8D63A059BFB8}" type="slidenum">
               <a:rPr lang="en-US" smtClean="0"/>
               <a:pPr/>
-              <a:t>13</a:t>
+              <a:t>17</a:t>
             </a:fld>
             <a:endParaRPr lang="en-US" dirty="0"/>
           </a:p>
@@ -6364,7 +7948,7 @@
         <p:spPr>
           <a:xfrm>
             <a:off x="77638" y="1123837"/>
-            <a:ext cx="3252158" cy="4601183"/>
+            <a:ext cx="3334430" cy="4601183"/>
           </a:xfrm>
         </p:spPr>
         <p:txBody>
@@ -6373,7 +7957,7 @@
           <a:p>
             <a:r>
               <a:rPr lang="fr-CH" dirty="0"/>
-              <a:t>Fondements théoriques - NLP</a:t>
+              <a:t>Fondements théoriques – NLP </a:t>
             </a:r>
           </a:p>
         </p:txBody>
@@ -6549,7 +8133,7 @@
               <a:rPr lang="fr-CH" sz="2800" b="1" dirty="0">
                 <a:latin typeface="+mj-lt"/>
               </a:rPr>
-              <a:t>Structure ?</a:t>
+              <a:t>Structure</a:t>
             </a:r>
           </a:p>
           <a:p>
@@ -6662,8 +8246,8 @@
         </p:nvSpPr>
         <p:spPr>
           <a:xfrm>
-            <a:off x="86264" y="1123837"/>
-            <a:ext cx="3278038" cy="4601183"/>
+            <a:off x="86263" y="1123837"/>
+            <a:ext cx="3347049" cy="4601183"/>
           </a:xfrm>
         </p:spPr>
         <p:txBody>
@@ -6672,7 +8256,7 @@
           <a:p>
             <a:r>
               <a:rPr lang="fr-CH" dirty="0"/>
-              <a:t>Fondements théoriques - NLP</a:t>
+              <a:t>Fondements théoriques – NLP </a:t>
             </a:r>
           </a:p>
         </p:txBody>
@@ -7043,7 +8627,7 @@
         <p:spPr>
           <a:xfrm>
             <a:off x="60384" y="1123837"/>
-            <a:ext cx="3312543" cy="4601183"/>
+            <a:ext cx="3364303" cy="4601183"/>
           </a:xfrm>
         </p:spPr>
         <p:txBody>
@@ -7052,7 +8636,7 @@
           <a:p>
             <a:r>
               <a:rPr lang="fr-CH" dirty="0"/>
-              <a:t>Fondements théoriques - NLP</a:t>
+              <a:t>Fondements théoriques – NLP </a:t>
             </a:r>
           </a:p>
         </p:txBody>

</xml_diff>